<commit_message>
chore: continue the presentation
</commit_message>
<xml_diff>
--- a/docs/presentation.pptx
+++ b/docs/presentation.pptx
@@ -9,6 +9,13 @@
     <p:sldId id="257" r:id="rId3"/>
     <p:sldId id="261" r:id="rId4"/>
     <p:sldId id="259" r:id="rId5"/>
+    <p:sldId id="262" r:id="rId6"/>
+    <p:sldId id="264" r:id="rId7"/>
+    <p:sldId id="265" r:id="rId8"/>
+    <p:sldId id="266" r:id="rId9"/>
+    <p:sldId id="267" r:id="rId10"/>
+    <p:sldId id="268" r:id="rId11"/>
+    <p:sldId id="269" r:id="rId12"/>
   </p:sldIdLst>
   <p:sldSz cx="12192000" cy="6858000"/>
   <p:notesSz cx="6858000" cy="9144000"/>
@@ -107,6 +114,11 @@
       </a:defRPr>
     </a:lvl9pPr>
   </p:defaultTextStyle>
+  <p:extLst>
+    <p:ext uri="{EFAFB233-063F-42B5-8137-9DF3F51BA10A}">
+      <p15:sldGuideLst xmlns:p15="http://schemas.microsoft.com/office/powerpoint/2012/main"/>
+    </p:ext>
+  </p:extLst>
 </p:presentation>
 </file>
 
@@ -5902,6 +5914,238 @@
 </p:sld>
 </file>
 
+<file path=ppt/slides/slide10.xml><?xml version="1.0" encoding="utf-8"?>
+<p:sld xmlns:a="http://schemas.openxmlformats.org/drawingml/2006/main" xmlns:r="http://schemas.openxmlformats.org/officeDocument/2006/relationships" xmlns:p="http://schemas.openxmlformats.org/presentationml/2006/main">
+  <p:cSld>
+    <p:spTree>
+      <p:nvGrpSpPr>
+        <p:cNvPr id="1" name=""/>
+        <p:cNvGrpSpPr/>
+        <p:nvPr/>
+      </p:nvGrpSpPr>
+      <p:grpSpPr>
+        <a:xfrm>
+          <a:off x="0" y="0"/>
+          <a:ext cx="0" cy="0"/>
+          <a:chOff x="0" y="0"/>
+          <a:chExt cx="0" cy="0"/>
+        </a:xfrm>
+      </p:grpSpPr>
+      <p:sp>
+        <p:nvSpPr>
+          <p:cNvPr id="2" name="Título 1">
+            <a:extLst>
+              <a:ext uri="{FF2B5EF4-FFF2-40B4-BE49-F238E27FC236}">
+                <a16:creationId xmlns:a16="http://schemas.microsoft.com/office/drawing/2014/main" id="{97C3E317-4DA5-0887-B670-1C5B5AF9E766}"/>
+              </a:ext>
+            </a:extLst>
+          </p:cNvPr>
+          <p:cNvSpPr>
+            <a:spLocks noGrp="1"/>
+          </p:cNvSpPr>
+          <p:nvPr>
+            <p:ph type="title"/>
+          </p:nvPr>
+        </p:nvSpPr>
+        <p:spPr>
+          <a:xfrm>
+            <a:off x="1587710" y="455363"/>
+            <a:ext cx="9486690" cy="695802"/>
+          </a:xfrm>
+        </p:spPr>
+        <p:txBody>
+          <a:bodyPr>
+            <a:normAutofit/>
+          </a:bodyPr>
+          <a:lstStyle/>
+          <a:p>
+            <a:r>
+              <a:rPr lang="pt-PT" sz="3200" dirty="0" err="1"/>
+              <a:t>Conclusions</a:t>
+            </a:r>
+            <a:endParaRPr lang="pt-PT" sz="3200" dirty="0"/>
+          </a:p>
+        </p:txBody>
+      </p:sp>
+      <p:sp>
+        <p:nvSpPr>
+          <p:cNvPr id="3" name="Marcador de Posição de Conteúdo 2">
+            <a:extLst>
+              <a:ext uri="{FF2B5EF4-FFF2-40B4-BE49-F238E27FC236}">
+                <a16:creationId xmlns:a16="http://schemas.microsoft.com/office/drawing/2014/main" id="{307F6385-7A4D-4E91-6A02-EE6CA6E1B763}"/>
+              </a:ext>
+            </a:extLst>
+          </p:cNvPr>
+          <p:cNvSpPr>
+            <a:spLocks noGrp="1"/>
+          </p:cNvSpPr>
+          <p:nvPr>
+            <p:ph idx="1"/>
+          </p:nvPr>
+        </p:nvSpPr>
+        <p:spPr>
+          <a:xfrm>
+            <a:off x="1587710" y="1151165"/>
+            <a:ext cx="9486690" cy="4935003"/>
+          </a:xfrm>
+        </p:spPr>
+        <p:txBody>
+          <a:bodyPr>
+            <a:normAutofit/>
+          </a:bodyPr>
+          <a:lstStyle/>
+          <a:p>
+            <a:r>
+              <a:rPr lang="en-US" sz="1600" dirty="0"/>
+              <a:t>TOMAS COMPLETE HERE</a:t>
+            </a:r>
+            <a:endParaRPr lang="pt-PT" sz="2000" dirty="0"/>
+          </a:p>
+        </p:txBody>
+      </p:sp>
+    </p:spTree>
+    <p:extLst>
+      <p:ext uri="{BB962C8B-B14F-4D97-AF65-F5344CB8AC3E}">
+        <p14:creationId xmlns:p14="http://schemas.microsoft.com/office/powerpoint/2010/main" val="2864802808"/>
+      </p:ext>
+    </p:extLst>
+  </p:cSld>
+  <p:clrMapOvr>
+    <a:masterClrMapping/>
+  </p:clrMapOvr>
+</p:sld>
+</file>
+
+<file path=ppt/slides/slide11.xml><?xml version="1.0" encoding="utf-8"?>
+<p:sld xmlns:a="http://schemas.openxmlformats.org/drawingml/2006/main" xmlns:r="http://schemas.openxmlformats.org/officeDocument/2006/relationships" xmlns:p="http://schemas.openxmlformats.org/presentationml/2006/main">
+  <p:cSld>
+    <p:spTree>
+      <p:nvGrpSpPr>
+        <p:cNvPr id="1" name=""/>
+        <p:cNvGrpSpPr/>
+        <p:nvPr/>
+      </p:nvGrpSpPr>
+      <p:grpSpPr>
+        <a:xfrm>
+          <a:off x="0" y="0"/>
+          <a:ext cx="0" cy="0"/>
+          <a:chOff x="0" y="0"/>
+          <a:chExt cx="0" cy="0"/>
+        </a:xfrm>
+      </p:grpSpPr>
+      <p:sp>
+        <p:nvSpPr>
+          <p:cNvPr id="2" name="Título 1">
+            <a:extLst>
+              <a:ext uri="{FF2B5EF4-FFF2-40B4-BE49-F238E27FC236}">
+                <a16:creationId xmlns:a16="http://schemas.microsoft.com/office/drawing/2014/main" id="{97C3E317-4DA5-0887-B670-1C5B5AF9E766}"/>
+              </a:ext>
+            </a:extLst>
+          </p:cNvPr>
+          <p:cNvSpPr>
+            <a:spLocks noGrp="1"/>
+          </p:cNvSpPr>
+          <p:nvPr>
+            <p:ph type="title"/>
+          </p:nvPr>
+        </p:nvSpPr>
+        <p:spPr>
+          <a:xfrm>
+            <a:off x="1587710" y="455363"/>
+            <a:ext cx="9486690" cy="695802"/>
+          </a:xfrm>
+        </p:spPr>
+        <p:txBody>
+          <a:bodyPr>
+            <a:normAutofit/>
+          </a:bodyPr>
+          <a:lstStyle/>
+          <a:p>
+            <a:r>
+              <a:rPr lang="pt-PT" sz="3200" dirty="0" err="1"/>
+              <a:t>Implemented</a:t>
+            </a:r>
+            <a:r>
+              <a:rPr lang="pt-PT" sz="3200" dirty="0"/>
+              <a:t> Classes</a:t>
+            </a:r>
+          </a:p>
+        </p:txBody>
+      </p:sp>
+      <p:sp>
+        <p:nvSpPr>
+          <p:cNvPr id="3" name="Marcador de Posição de Conteúdo 2">
+            <a:extLst>
+              <a:ext uri="{FF2B5EF4-FFF2-40B4-BE49-F238E27FC236}">
+                <a16:creationId xmlns:a16="http://schemas.microsoft.com/office/drawing/2014/main" id="{307F6385-7A4D-4E91-6A02-EE6CA6E1B763}"/>
+              </a:ext>
+            </a:extLst>
+          </p:cNvPr>
+          <p:cNvSpPr>
+            <a:spLocks noGrp="1"/>
+          </p:cNvSpPr>
+          <p:nvPr>
+            <p:ph idx="1"/>
+          </p:nvPr>
+        </p:nvSpPr>
+        <p:spPr>
+          <a:xfrm>
+            <a:off x="1587710" y="1151165"/>
+            <a:ext cx="9486690" cy="4935003"/>
+          </a:xfrm>
+        </p:spPr>
+        <p:txBody>
+          <a:bodyPr>
+            <a:normAutofit/>
+          </a:bodyPr>
+          <a:lstStyle/>
+          <a:p>
+            <a:r>
+              <a:rPr lang="en-US" sz="1600" dirty="0"/>
+              <a:t>Additional slides, not to the presentation</a:t>
+            </a:r>
+          </a:p>
+          <a:p>
+            <a:pPr lvl="1"/>
+            <a:r>
+              <a:rPr lang="en-US" sz="1700" dirty="0"/>
+              <a:t>Talk about the other classes implemented, order, utils, </a:t>
+            </a:r>
+            <a:r>
+              <a:rPr lang="en-US" sz="1700" dirty="0" err="1"/>
+              <a:t>etc</a:t>
+            </a:r>
+            <a:endParaRPr lang="en-US" sz="1700" dirty="0"/>
+          </a:p>
+          <a:p>
+            <a:pPr lvl="1"/>
+            <a:r>
+              <a:rPr lang="en-US" sz="1700" dirty="0"/>
+              <a:t>Give a detailed execution example</a:t>
+            </a:r>
+          </a:p>
+          <a:p>
+            <a:pPr lvl="1"/>
+            <a:r>
+              <a:rPr lang="en-US" sz="1700" dirty="0"/>
+              <a:t>JULI MAKE THIS ONES PLEASE, just two or three slides maybe, one for classes and one for the example</a:t>
+            </a:r>
+          </a:p>
+        </p:txBody>
+      </p:sp>
+    </p:spTree>
+    <p:extLst>
+      <p:ext uri="{BB962C8B-B14F-4D97-AF65-F5344CB8AC3E}">
+        <p14:creationId xmlns:p14="http://schemas.microsoft.com/office/powerpoint/2010/main" val="2253824427"/>
+      </p:ext>
+    </p:extLst>
+  </p:cSld>
+  <p:clrMapOvr>
+    <a:masterClrMapping/>
+  </p:clrMapOvr>
+</p:sld>
+</file>
+
 <file path=ppt/slides/slide2.xml><?xml version="1.0" encoding="utf-8"?>
 <p:sld xmlns:a="http://schemas.openxmlformats.org/drawingml/2006/main" xmlns:r="http://schemas.openxmlformats.org/officeDocument/2006/relationships" xmlns:p="http://schemas.openxmlformats.org/presentationml/2006/main">
   <p:cSld>
@@ -6788,8 +7032,12 @@
           <a:p>
             <a:pPr algn="ctr"/>
             <a:r>
+              <a:rPr lang="pt-PT" dirty="0" err="1"/>
+              <a:t>Data.json</a:t>
+            </a:r>
+            <a:r>
               <a:rPr lang="pt-PT" dirty="0"/>
-              <a:t>data </a:t>
+              <a:t> </a:t>
             </a:r>
             <a:r>
               <a:rPr lang="pt-PT" sz="1200" i="1" dirty="0"/>
@@ -6909,13 +7157,28 @@
           <a:p>
             <a:r>
               <a:rPr lang="en-US" sz="1600" dirty="0"/>
-              <a:t>After that, the Market sends to the subscribers the daily </a:t>
-            </a:r>
-            <a:r>
-              <a:rPr lang="en-US" sz="1600"/>
-              <a:t>stocks information</a:t>
-            </a:r>
-            <a:endParaRPr lang="en-US" sz="1600" dirty="0"/>
+              <a:t>After that, the Market sends to the subscribers the daily stocks information, which triggers the trader to execute its strategy.</a:t>
+            </a:r>
+          </a:p>
+          <a:p>
+            <a:r>
+              <a:rPr lang="en-US" sz="1600" dirty="0"/>
+              <a:t>Then, the Trader initiates a </a:t>
+            </a:r>
+            <a:r>
+              <a:rPr lang="en-US" sz="1600" i="1" dirty="0" err="1"/>
+              <a:t>ContractNet</a:t>
+            </a:r>
+            <a:r>
+              <a:rPr lang="en-US" sz="1600" dirty="0"/>
+              <a:t> protocol with all the Brokers, for each trade that it wants to execute.</a:t>
+            </a:r>
+          </a:p>
+          <a:p>
+            <a:r>
+              <a:rPr lang="en-US" sz="1600" dirty="0"/>
+              <a:t>Finally, whenever a broker has an order accepted, it send to the Exchange, which register the order, and the process is complete.</a:t>
+            </a:r>
           </a:p>
         </p:txBody>
       </p:sp>
@@ -6950,7 +7213,7 @@
         </p:blipFill>
         <p:spPr>
           <a:xfrm>
-            <a:off x="8612772" y="4151232"/>
+            <a:off x="8629950" y="4451648"/>
             <a:ext cx="914400" cy="914400"/>
           </a:xfrm>
           <a:prstGeom prst="rect">
@@ -6989,7 +7252,7 @@
         </p:blipFill>
         <p:spPr>
           <a:xfrm>
-            <a:off x="3200146" y="4151232"/>
+            <a:off x="3209573" y="4481170"/>
             <a:ext cx="914400" cy="914400"/>
           </a:xfrm>
           <a:prstGeom prst="rect">
@@ -7028,7 +7291,7 @@
         </p:blipFill>
         <p:spPr>
           <a:xfrm>
-            <a:off x="4943042" y="4151232"/>
+            <a:off x="5084976" y="4480896"/>
             <a:ext cx="914400" cy="914400"/>
           </a:xfrm>
           <a:prstGeom prst="rect">
@@ -7067,7 +7330,7 @@
         </p:blipFill>
         <p:spPr>
           <a:xfrm>
-            <a:off x="6685938" y="4122250"/>
+            <a:off x="6953146" y="4451648"/>
             <a:ext cx="914400" cy="914400"/>
           </a:xfrm>
           <a:prstGeom prst="rect">
@@ -7089,7 +7352,7 @@
         </p:nvSpPr>
         <p:spPr>
           <a:xfrm>
-            <a:off x="3139178" y="5036650"/>
+            <a:off x="3148605" y="5366588"/>
             <a:ext cx="1040767" cy="369332"/>
           </a:xfrm>
           <a:prstGeom prst="rect">
@@ -7126,7 +7389,7 @@
         </p:nvSpPr>
         <p:spPr>
           <a:xfrm>
-            <a:off x="4879858" y="5036650"/>
+            <a:off x="5021792" y="5366314"/>
             <a:ext cx="1040767" cy="369332"/>
           </a:xfrm>
           <a:prstGeom prst="rect">
@@ -7163,7 +7426,7 @@
         </p:nvSpPr>
         <p:spPr>
           <a:xfrm>
-            <a:off x="6620539" y="5036650"/>
+            <a:off x="6887747" y="5366048"/>
             <a:ext cx="1040767" cy="369332"/>
           </a:xfrm>
           <a:prstGeom prst="rect">
@@ -7199,7 +7462,7 @@
         </p:nvSpPr>
         <p:spPr>
           <a:xfrm>
-            <a:off x="8424403" y="5038486"/>
+            <a:off x="8441581" y="5338902"/>
             <a:ext cx="1291138" cy="369332"/>
           </a:xfrm>
           <a:prstGeom prst="rect">
@@ -7221,10 +7484,3291 @@
           </a:p>
         </p:txBody>
       </p:sp>
+      <p:sp>
+        <p:nvSpPr>
+          <p:cNvPr id="8" name="Seta: Curvada Para Cima 7">
+            <a:extLst>
+              <a:ext uri="{FF2B5EF4-FFF2-40B4-BE49-F238E27FC236}">
+                <a16:creationId xmlns:a16="http://schemas.microsoft.com/office/drawing/2014/main" id="{9CC79A48-9265-898A-6B24-9D279EE2CCC7}"/>
+              </a:ext>
+            </a:extLst>
+          </p:cNvPr>
+          <p:cNvSpPr/>
+          <p:nvPr/>
+        </p:nvSpPr>
+        <p:spPr>
+          <a:xfrm>
+            <a:off x="3940823" y="5791291"/>
+            <a:ext cx="1436914" cy="369332"/>
+          </a:xfrm>
+          <a:prstGeom prst="curvedUpArrow">
+            <a:avLst/>
+          </a:prstGeom>
+        </p:spPr>
+        <p:style>
+          <a:lnRef idx="2">
+            <a:schemeClr val="accent1">
+              <a:shade val="50000"/>
+            </a:schemeClr>
+          </a:lnRef>
+          <a:fillRef idx="1">
+            <a:schemeClr val="accent1"/>
+          </a:fillRef>
+          <a:effectRef idx="0">
+            <a:schemeClr val="accent1"/>
+          </a:effectRef>
+          <a:fontRef idx="minor">
+            <a:schemeClr val="lt1"/>
+          </a:fontRef>
+        </p:style>
+        <p:txBody>
+          <a:bodyPr rtlCol="0" anchor="ctr"/>
+          <a:lstStyle/>
+          <a:p>
+            <a:pPr algn="ctr"/>
+            <a:endParaRPr lang="pt-PT">
+              <a:solidFill>
+                <a:schemeClr val="tx1"/>
+              </a:solidFill>
+            </a:endParaRPr>
+          </a:p>
+        </p:txBody>
+      </p:sp>
+      <p:sp>
+        <p:nvSpPr>
+          <p:cNvPr id="10" name="Seta: Curvada Para Cima 9">
+            <a:extLst>
+              <a:ext uri="{FF2B5EF4-FFF2-40B4-BE49-F238E27FC236}">
+                <a16:creationId xmlns:a16="http://schemas.microsoft.com/office/drawing/2014/main" id="{C06FD017-7FC9-9ECC-7652-6605DC574A69}"/>
+              </a:ext>
+            </a:extLst>
+          </p:cNvPr>
+          <p:cNvSpPr/>
+          <p:nvPr/>
+        </p:nvSpPr>
+        <p:spPr>
+          <a:xfrm>
+            <a:off x="5742373" y="5791291"/>
+            <a:ext cx="1436914" cy="369332"/>
+          </a:xfrm>
+          <a:prstGeom prst="curvedUpArrow">
+            <a:avLst/>
+          </a:prstGeom>
+        </p:spPr>
+        <p:style>
+          <a:lnRef idx="2">
+            <a:schemeClr val="accent1">
+              <a:shade val="50000"/>
+            </a:schemeClr>
+          </a:lnRef>
+          <a:fillRef idx="1">
+            <a:schemeClr val="accent1"/>
+          </a:fillRef>
+          <a:effectRef idx="0">
+            <a:schemeClr val="accent1"/>
+          </a:effectRef>
+          <a:fontRef idx="minor">
+            <a:schemeClr val="lt1"/>
+          </a:fontRef>
+        </p:style>
+        <p:txBody>
+          <a:bodyPr rtlCol="0" anchor="ctr"/>
+          <a:lstStyle/>
+          <a:p>
+            <a:pPr algn="ctr"/>
+            <a:endParaRPr lang="pt-PT">
+              <a:solidFill>
+                <a:schemeClr val="tx1"/>
+              </a:solidFill>
+            </a:endParaRPr>
+          </a:p>
+        </p:txBody>
+      </p:sp>
+      <p:sp>
+        <p:nvSpPr>
+          <p:cNvPr id="16" name="Seta: Curvada Para Cima 15">
+            <a:extLst>
+              <a:ext uri="{FF2B5EF4-FFF2-40B4-BE49-F238E27FC236}">
+                <a16:creationId xmlns:a16="http://schemas.microsoft.com/office/drawing/2014/main" id="{F2771144-0B6C-F421-32D8-1B1DAA10FABA}"/>
+              </a:ext>
+            </a:extLst>
+          </p:cNvPr>
+          <p:cNvSpPr/>
+          <p:nvPr/>
+        </p:nvSpPr>
+        <p:spPr>
+          <a:xfrm>
+            <a:off x="7485476" y="5790088"/>
+            <a:ext cx="1436914" cy="369332"/>
+          </a:xfrm>
+          <a:prstGeom prst="curvedUpArrow">
+            <a:avLst/>
+          </a:prstGeom>
+        </p:spPr>
+        <p:style>
+          <a:lnRef idx="2">
+            <a:schemeClr val="accent1">
+              <a:shade val="50000"/>
+            </a:schemeClr>
+          </a:lnRef>
+          <a:fillRef idx="1">
+            <a:schemeClr val="accent1"/>
+          </a:fillRef>
+          <a:effectRef idx="0">
+            <a:schemeClr val="accent1"/>
+          </a:effectRef>
+          <a:fontRef idx="minor">
+            <a:schemeClr val="lt1"/>
+          </a:fontRef>
+        </p:style>
+        <p:txBody>
+          <a:bodyPr rtlCol="0" anchor="ctr"/>
+          <a:lstStyle/>
+          <a:p>
+            <a:pPr algn="ctr"/>
+            <a:endParaRPr lang="pt-PT">
+              <a:solidFill>
+                <a:schemeClr val="tx1"/>
+              </a:solidFill>
+            </a:endParaRPr>
+          </a:p>
+        </p:txBody>
+      </p:sp>
+      <p:sp>
+        <p:nvSpPr>
+          <p:cNvPr id="17" name="Seta: Curvada Para Cima 16">
+            <a:extLst>
+              <a:ext uri="{FF2B5EF4-FFF2-40B4-BE49-F238E27FC236}">
+                <a16:creationId xmlns:a16="http://schemas.microsoft.com/office/drawing/2014/main" id="{58AAFD5A-AC5E-11E5-6F36-B3AF1E4B817B}"/>
+              </a:ext>
+            </a:extLst>
+          </p:cNvPr>
+          <p:cNvSpPr/>
+          <p:nvPr/>
+        </p:nvSpPr>
+        <p:spPr>
+          <a:xfrm rot="10574375">
+            <a:off x="5680792" y="4200981"/>
+            <a:ext cx="1436914" cy="369332"/>
+          </a:xfrm>
+          <a:prstGeom prst="curvedUpArrow">
+            <a:avLst/>
+          </a:prstGeom>
+        </p:spPr>
+        <p:style>
+          <a:lnRef idx="2">
+            <a:schemeClr val="accent1">
+              <a:shade val="50000"/>
+            </a:schemeClr>
+          </a:lnRef>
+          <a:fillRef idx="1">
+            <a:schemeClr val="accent1"/>
+          </a:fillRef>
+          <a:effectRef idx="0">
+            <a:schemeClr val="accent1"/>
+          </a:effectRef>
+          <a:fontRef idx="minor">
+            <a:schemeClr val="lt1"/>
+          </a:fontRef>
+        </p:style>
+        <p:txBody>
+          <a:bodyPr rtlCol="0" anchor="ctr"/>
+          <a:lstStyle/>
+          <a:p>
+            <a:pPr algn="ctr"/>
+            <a:endParaRPr lang="pt-PT">
+              <a:solidFill>
+                <a:schemeClr val="tx1"/>
+              </a:solidFill>
+            </a:endParaRPr>
+          </a:p>
+        </p:txBody>
+      </p:sp>
+      <p:sp>
+        <p:nvSpPr>
+          <p:cNvPr id="18" name="Seta: Curvada Para Cima 17">
+            <a:extLst>
+              <a:ext uri="{FF2B5EF4-FFF2-40B4-BE49-F238E27FC236}">
+                <a16:creationId xmlns:a16="http://schemas.microsoft.com/office/drawing/2014/main" id="{931C7D2E-CFC7-98A1-BAFD-AD909C4700A0}"/>
+              </a:ext>
+            </a:extLst>
+          </p:cNvPr>
+          <p:cNvSpPr/>
+          <p:nvPr/>
+        </p:nvSpPr>
+        <p:spPr>
+          <a:xfrm rot="10574375">
+            <a:off x="3930258" y="4187542"/>
+            <a:ext cx="1436914" cy="369332"/>
+          </a:xfrm>
+          <a:prstGeom prst="curvedUpArrow">
+            <a:avLst/>
+          </a:prstGeom>
+        </p:spPr>
+        <p:style>
+          <a:lnRef idx="2">
+            <a:schemeClr val="accent1">
+              <a:shade val="50000"/>
+            </a:schemeClr>
+          </a:lnRef>
+          <a:fillRef idx="1">
+            <a:schemeClr val="accent1"/>
+          </a:fillRef>
+          <a:effectRef idx="0">
+            <a:schemeClr val="accent1"/>
+          </a:effectRef>
+          <a:fontRef idx="minor">
+            <a:schemeClr val="lt1"/>
+          </a:fontRef>
+        </p:style>
+        <p:txBody>
+          <a:bodyPr rtlCol="0" anchor="ctr"/>
+          <a:lstStyle/>
+          <a:p>
+            <a:pPr algn="ctr"/>
+            <a:endParaRPr lang="pt-PT" dirty="0">
+              <a:solidFill>
+                <a:schemeClr val="tx1"/>
+              </a:solidFill>
+            </a:endParaRPr>
+          </a:p>
+        </p:txBody>
+      </p:sp>
+      <p:sp>
+        <p:nvSpPr>
+          <p:cNvPr id="19" name="Seta: Curvada Para Cima 18">
+            <a:extLst>
+              <a:ext uri="{FF2B5EF4-FFF2-40B4-BE49-F238E27FC236}">
+                <a16:creationId xmlns:a16="http://schemas.microsoft.com/office/drawing/2014/main" id="{2359DCA5-0095-BB0E-F248-5E8D647F93CF}"/>
+              </a:ext>
+            </a:extLst>
+          </p:cNvPr>
+          <p:cNvSpPr/>
+          <p:nvPr/>
+        </p:nvSpPr>
+        <p:spPr>
+          <a:xfrm rot="10574375">
+            <a:off x="7496040" y="4074804"/>
+            <a:ext cx="1436914" cy="369332"/>
+          </a:xfrm>
+          <a:prstGeom prst="curvedUpArrow">
+            <a:avLst/>
+          </a:prstGeom>
+        </p:spPr>
+        <p:style>
+          <a:lnRef idx="2">
+            <a:schemeClr val="accent1">
+              <a:shade val="50000"/>
+            </a:schemeClr>
+          </a:lnRef>
+          <a:fillRef idx="1">
+            <a:schemeClr val="accent1"/>
+          </a:fillRef>
+          <a:effectRef idx="0">
+            <a:schemeClr val="accent1"/>
+          </a:effectRef>
+          <a:fontRef idx="minor">
+            <a:schemeClr val="lt1"/>
+          </a:fontRef>
+        </p:style>
+        <p:txBody>
+          <a:bodyPr rtlCol="0" anchor="ctr"/>
+          <a:lstStyle/>
+          <a:p>
+            <a:pPr algn="ctr"/>
+            <a:endParaRPr lang="pt-PT" dirty="0">
+              <a:solidFill>
+                <a:schemeClr val="tx1"/>
+              </a:solidFill>
+            </a:endParaRPr>
+          </a:p>
+        </p:txBody>
+      </p:sp>
+      <p:sp>
+        <p:nvSpPr>
+          <p:cNvPr id="20" name="CaixaDeTexto 19">
+            <a:extLst>
+              <a:ext uri="{FF2B5EF4-FFF2-40B4-BE49-F238E27FC236}">
+                <a16:creationId xmlns:a16="http://schemas.microsoft.com/office/drawing/2014/main" id="{8ED27578-C96E-4E84-F834-4A3FF86CB3B0}"/>
+              </a:ext>
+            </a:extLst>
+          </p:cNvPr>
+          <p:cNvSpPr txBox="1"/>
+          <p:nvPr/>
+        </p:nvSpPr>
+        <p:spPr>
+          <a:xfrm>
+            <a:off x="4138896" y="6161170"/>
+            <a:ext cx="1040767" cy="477054"/>
+          </a:xfrm>
+          <a:prstGeom prst="rect">
+            <a:avLst/>
+          </a:prstGeom>
+          <a:noFill/>
+        </p:spPr>
+        <p:txBody>
+          <a:bodyPr wrap="square" rtlCol="0">
+            <a:spAutoFit/>
+          </a:bodyPr>
+          <a:lstStyle/>
+          <a:p>
+            <a:pPr algn="ctr"/>
+            <a:r>
+              <a:rPr lang="pt-PT" sz="1200" b="1" dirty="0" err="1"/>
+              <a:t>Notify</a:t>
+            </a:r>
+            <a:r>
+              <a:rPr lang="pt-PT" sz="1400" b="1" dirty="0"/>
+              <a:t> </a:t>
+            </a:r>
+            <a:r>
+              <a:rPr lang="pt-PT" sz="1050" b="1" i="1" dirty="0"/>
+              <a:t>(</a:t>
+            </a:r>
+            <a:r>
+              <a:rPr lang="pt-PT" sz="1050" b="1" i="1" dirty="0" err="1"/>
+              <a:t>Propagate</a:t>
+            </a:r>
+            <a:r>
+              <a:rPr lang="pt-PT" sz="1050" b="1" i="1" dirty="0"/>
+              <a:t>)</a:t>
+            </a:r>
+            <a:endParaRPr lang="pt-PT" sz="1400" b="1" i="1" dirty="0"/>
+          </a:p>
+        </p:txBody>
+      </p:sp>
+      <p:sp>
+        <p:nvSpPr>
+          <p:cNvPr id="21" name="CaixaDeTexto 20">
+            <a:extLst>
+              <a:ext uri="{FF2B5EF4-FFF2-40B4-BE49-F238E27FC236}">
+                <a16:creationId xmlns:a16="http://schemas.microsoft.com/office/drawing/2014/main" id="{6B1D7B1B-B25D-F6B6-D769-667CD2D567E4}"/>
+              </a:ext>
+            </a:extLst>
+          </p:cNvPr>
+          <p:cNvSpPr txBox="1"/>
+          <p:nvPr/>
+        </p:nvSpPr>
+        <p:spPr>
+          <a:xfrm>
+            <a:off x="4097594" y="3849183"/>
+            <a:ext cx="1123370" cy="276999"/>
+          </a:xfrm>
+          <a:prstGeom prst="rect">
+            <a:avLst/>
+          </a:prstGeom>
+          <a:noFill/>
+        </p:spPr>
+        <p:txBody>
+          <a:bodyPr wrap="square" rtlCol="0">
+            <a:spAutoFit/>
+          </a:bodyPr>
+          <a:lstStyle/>
+          <a:p>
+            <a:pPr algn="ctr"/>
+            <a:r>
+              <a:rPr lang="pt-PT" sz="1200" b="1" dirty="0" err="1"/>
+              <a:t>Subscribe</a:t>
+            </a:r>
+            <a:endParaRPr lang="pt-PT" sz="1400" b="1" dirty="0"/>
+          </a:p>
+        </p:txBody>
+      </p:sp>
+      <p:sp>
+        <p:nvSpPr>
+          <p:cNvPr id="35" name="CaixaDeTexto 34">
+            <a:extLst>
+              <a:ext uri="{FF2B5EF4-FFF2-40B4-BE49-F238E27FC236}">
+                <a16:creationId xmlns:a16="http://schemas.microsoft.com/office/drawing/2014/main" id="{16043735-6B66-1CD5-C94E-A9A7CB16FCE3}"/>
+              </a:ext>
+            </a:extLst>
+          </p:cNvPr>
+          <p:cNvSpPr txBox="1"/>
+          <p:nvPr/>
+        </p:nvSpPr>
+        <p:spPr>
+          <a:xfrm>
+            <a:off x="5899145" y="3702636"/>
+            <a:ext cx="1123370" cy="461665"/>
+          </a:xfrm>
+          <a:prstGeom prst="rect">
+            <a:avLst/>
+          </a:prstGeom>
+          <a:noFill/>
+        </p:spPr>
+        <p:txBody>
+          <a:bodyPr wrap="square" rtlCol="0">
+            <a:spAutoFit/>
+          </a:bodyPr>
+          <a:lstStyle/>
+          <a:p>
+            <a:pPr algn="ctr"/>
+            <a:r>
+              <a:rPr lang="pt-PT" sz="1200" b="1" dirty="0" err="1"/>
+              <a:t>Propose</a:t>
+            </a:r>
+            <a:endParaRPr lang="pt-PT" sz="1200" b="1" dirty="0"/>
+          </a:p>
+          <a:p>
+            <a:pPr algn="ctr"/>
+            <a:r>
+              <a:rPr lang="pt-PT" sz="1200" b="1" dirty="0" err="1"/>
+              <a:t>Inform</a:t>
+            </a:r>
+            <a:endParaRPr lang="pt-PT" sz="1200" b="1" dirty="0"/>
+          </a:p>
+        </p:txBody>
+      </p:sp>
+      <p:sp>
+        <p:nvSpPr>
+          <p:cNvPr id="36" name="CaixaDeTexto 35">
+            <a:extLst>
+              <a:ext uri="{FF2B5EF4-FFF2-40B4-BE49-F238E27FC236}">
+                <a16:creationId xmlns:a16="http://schemas.microsoft.com/office/drawing/2014/main" id="{9F692EAC-D67C-E9B7-7079-0AC855BF27A3}"/>
+              </a:ext>
+            </a:extLst>
+          </p:cNvPr>
+          <p:cNvSpPr txBox="1"/>
+          <p:nvPr/>
+        </p:nvSpPr>
+        <p:spPr>
+          <a:xfrm>
+            <a:off x="5615266" y="6159420"/>
+            <a:ext cx="1691128" cy="492443"/>
+          </a:xfrm>
+          <a:prstGeom prst="rect">
+            <a:avLst/>
+          </a:prstGeom>
+          <a:noFill/>
+        </p:spPr>
+        <p:txBody>
+          <a:bodyPr wrap="square" rtlCol="0">
+            <a:spAutoFit/>
+          </a:bodyPr>
+          <a:lstStyle/>
+          <a:p>
+            <a:pPr algn="ctr"/>
+            <a:r>
+              <a:rPr lang="pt-PT" sz="1400" b="1" dirty="0"/>
+              <a:t>CFP</a:t>
+            </a:r>
+          </a:p>
+          <a:p>
+            <a:pPr algn="ctr"/>
+            <a:r>
+              <a:rPr lang="pt-PT" sz="1200" b="1" dirty="0" err="1"/>
+              <a:t>Accept-Proposal</a:t>
+            </a:r>
+            <a:endParaRPr lang="pt-PT" sz="1400" b="1" dirty="0"/>
+          </a:p>
+        </p:txBody>
+      </p:sp>
+      <p:sp>
+        <p:nvSpPr>
+          <p:cNvPr id="37" name="CaixaDeTexto 36">
+            <a:extLst>
+              <a:ext uri="{FF2B5EF4-FFF2-40B4-BE49-F238E27FC236}">
+                <a16:creationId xmlns:a16="http://schemas.microsoft.com/office/drawing/2014/main" id="{D96FA71D-BACF-2A25-8DFE-7EB44F5CBA22}"/>
+              </a:ext>
+            </a:extLst>
+          </p:cNvPr>
+          <p:cNvSpPr txBox="1"/>
+          <p:nvPr/>
+        </p:nvSpPr>
+        <p:spPr>
+          <a:xfrm>
+            <a:off x="7358369" y="3739454"/>
+            <a:ext cx="1691128" cy="307777"/>
+          </a:xfrm>
+          <a:prstGeom prst="rect">
+            <a:avLst/>
+          </a:prstGeom>
+          <a:noFill/>
+        </p:spPr>
+        <p:txBody>
+          <a:bodyPr wrap="square" rtlCol="0">
+            <a:spAutoFit/>
+          </a:bodyPr>
+          <a:lstStyle/>
+          <a:p>
+            <a:pPr algn="ctr"/>
+            <a:r>
+              <a:rPr lang="pt-PT" sz="1400" b="1" dirty="0" err="1"/>
+              <a:t>Agree</a:t>
+            </a:r>
+            <a:endParaRPr lang="pt-PT" sz="1400" b="1" dirty="0"/>
+          </a:p>
+        </p:txBody>
+      </p:sp>
+      <p:sp>
+        <p:nvSpPr>
+          <p:cNvPr id="38" name="CaixaDeTexto 37">
+            <a:extLst>
+              <a:ext uri="{FF2B5EF4-FFF2-40B4-BE49-F238E27FC236}">
+                <a16:creationId xmlns:a16="http://schemas.microsoft.com/office/drawing/2014/main" id="{2CA0B15D-4143-5E07-228B-6C59C59FB416}"/>
+              </a:ext>
+            </a:extLst>
+          </p:cNvPr>
+          <p:cNvSpPr txBox="1"/>
+          <p:nvPr/>
+        </p:nvSpPr>
+        <p:spPr>
+          <a:xfrm>
+            <a:off x="7363057" y="6169108"/>
+            <a:ext cx="1691128" cy="307777"/>
+          </a:xfrm>
+          <a:prstGeom prst="rect">
+            <a:avLst/>
+          </a:prstGeom>
+          <a:noFill/>
+        </p:spPr>
+        <p:txBody>
+          <a:bodyPr wrap="square" rtlCol="0">
+            <a:spAutoFit/>
+          </a:bodyPr>
+          <a:lstStyle/>
+          <a:p>
+            <a:pPr algn="ctr"/>
+            <a:r>
+              <a:rPr lang="pt-PT" sz="1400" b="1" dirty="0" err="1"/>
+              <a:t>Request</a:t>
+            </a:r>
+            <a:endParaRPr lang="pt-PT" sz="1400" b="1" dirty="0"/>
+          </a:p>
+        </p:txBody>
+      </p:sp>
+      <p:sp>
+        <p:nvSpPr>
+          <p:cNvPr id="39" name="CaixaDeTexto 38">
+            <a:extLst>
+              <a:ext uri="{FF2B5EF4-FFF2-40B4-BE49-F238E27FC236}">
+                <a16:creationId xmlns:a16="http://schemas.microsoft.com/office/drawing/2014/main" id="{A19BEEBE-1B91-A954-51C3-07FAB39E3F9B}"/>
+              </a:ext>
+            </a:extLst>
+          </p:cNvPr>
+          <p:cNvSpPr txBox="1"/>
+          <p:nvPr/>
+        </p:nvSpPr>
+        <p:spPr>
+          <a:xfrm>
+            <a:off x="4152733" y="4877237"/>
+            <a:ext cx="983674" cy="461665"/>
+          </a:xfrm>
+          <a:prstGeom prst="rect">
+            <a:avLst/>
+          </a:prstGeom>
+          <a:noFill/>
+        </p:spPr>
+        <p:txBody>
+          <a:bodyPr wrap="square" rtlCol="0">
+            <a:spAutoFit/>
+          </a:bodyPr>
+          <a:lstStyle/>
+          <a:p>
+            <a:pPr algn="ctr"/>
+            <a:r>
+              <a:rPr lang="pt-PT" sz="1200" b="1" dirty="0"/>
+              <a:t>FIPA-</a:t>
+            </a:r>
+            <a:r>
+              <a:rPr lang="pt-PT" sz="1200" b="1" dirty="0" err="1"/>
+              <a:t>Subscribe</a:t>
+            </a:r>
+            <a:endParaRPr lang="pt-PT" sz="1400" b="1" dirty="0"/>
+          </a:p>
+        </p:txBody>
+      </p:sp>
+      <p:sp>
+        <p:nvSpPr>
+          <p:cNvPr id="40" name="CaixaDeTexto 39">
+            <a:extLst>
+              <a:ext uri="{FF2B5EF4-FFF2-40B4-BE49-F238E27FC236}">
+                <a16:creationId xmlns:a16="http://schemas.microsoft.com/office/drawing/2014/main" id="{A37B8AD1-A712-17CF-922E-C89E65AE404A}"/>
+              </a:ext>
+            </a:extLst>
+          </p:cNvPr>
+          <p:cNvSpPr txBox="1"/>
+          <p:nvPr/>
+        </p:nvSpPr>
+        <p:spPr>
+          <a:xfrm>
+            <a:off x="5881772" y="4830457"/>
+            <a:ext cx="1123919" cy="461665"/>
+          </a:xfrm>
+          <a:prstGeom prst="rect">
+            <a:avLst/>
+          </a:prstGeom>
+          <a:noFill/>
+        </p:spPr>
+        <p:txBody>
+          <a:bodyPr wrap="square" rtlCol="0">
+            <a:spAutoFit/>
+          </a:bodyPr>
+          <a:lstStyle/>
+          <a:p>
+            <a:pPr algn="ctr"/>
+            <a:r>
+              <a:rPr lang="pt-PT" sz="1200" b="1" dirty="0"/>
+              <a:t>FIPA-</a:t>
+            </a:r>
+            <a:r>
+              <a:rPr lang="pt-PT" sz="1200" b="1" dirty="0" err="1"/>
+              <a:t>ContractNet</a:t>
+            </a:r>
+            <a:endParaRPr lang="pt-PT" sz="1400" b="1" dirty="0"/>
+          </a:p>
+        </p:txBody>
+      </p:sp>
+      <p:sp>
+        <p:nvSpPr>
+          <p:cNvPr id="41" name="CaixaDeTexto 40">
+            <a:extLst>
+              <a:ext uri="{FF2B5EF4-FFF2-40B4-BE49-F238E27FC236}">
+                <a16:creationId xmlns:a16="http://schemas.microsoft.com/office/drawing/2014/main" id="{D68FB614-7019-381C-F336-3F4257956664}"/>
+              </a:ext>
+            </a:extLst>
+          </p:cNvPr>
+          <p:cNvSpPr txBox="1"/>
+          <p:nvPr/>
+        </p:nvSpPr>
+        <p:spPr>
+          <a:xfrm>
+            <a:off x="7665876" y="4836033"/>
+            <a:ext cx="1123919" cy="461665"/>
+          </a:xfrm>
+          <a:prstGeom prst="rect">
+            <a:avLst/>
+          </a:prstGeom>
+          <a:noFill/>
+        </p:spPr>
+        <p:txBody>
+          <a:bodyPr wrap="square" rtlCol="0">
+            <a:spAutoFit/>
+          </a:bodyPr>
+          <a:lstStyle/>
+          <a:p>
+            <a:pPr algn="ctr"/>
+            <a:r>
+              <a:rPr lang="pt-PT" sz="1200" b="1" dirty="0"/>
+              <a:t>FIPA-</a:t>
+            </a:r>
+            <a:r>
+              <a:rPr lang="pt-PT" sz="1200" b="1" dirty="0" err="1"/>
+              <a:t>Request</a:t>
+            </a:r>
+            <a:endParaRPr lang="pt-PT" sz="1400" b="1" dirty="0"/>
+          </a:p>
+        </p:txBody>
+      </p:sp>
     </p:spTree>
     <p:extLst>
       <p:ext uri="{BB962C8B-B14F-4D97-AF65-F5344CB8AC3E}">
         <p14:creationId xmlns:p14="http://schemas.microsoft.com/office/powerpoint/2010/main" val="911787240"/>
+      </p:ext>
+    </p:extLst>
+  </p:cSld>
+  <p:clrMapOvr>
+    <a:masterClrMapping/>
+  </p:clrMapOvr>
+</p:sld>
+</file>
+
+<file path=ppt/slides/slide5.xml><?xml version="1.0" encoding="utf-8"?>
+<p:sld xmlns:a="http://schemas.openxmlformats.org/drawingml/2006/main" xmlns:r="http://schemas.openxmlformats.org/officeDocument/2006/relationships" xmlns:p="http://schemas.openxmlformats.org/presentationml/2006/main">
+  <p:cSld>
+    <p:bg>
+      <p:bgPr>
+        <a:solidFill>
+          <a:schemeClr val="bg1"/>
+        </a:solidFill>
+        <a:effectLst/>
+      </p:bgPr>
+    </p:bg>
+    <p:spTree>
+      <p:nvGrpSpPr>
+        <p:cNvPr id="1" name=""/>
+        <p:cNvGrpSpPr/>
+        <p:nvPr/>
+      </p:nvGrpSpPr>
+      <p:grpSpPr>
+        <a:xfrm>
+          <a:off x="0" y="0"/>
+          <a:ext cx="0" cy="0"/>
+          <a:chOff x="0" y="0"/>
+          <a:chExt cx="0" cy="0"/>
+        </a:xfrm>
+      </p:grpSpPr>
+      <p:sp useBgFill="1">
+        <p:nvSpPr>
+          <p:cNvPr id="8" name="Rectangle 7">
+            <a:extLst>
+              <a:ext uri="{FF2B5EF4-FFF2-40B4-BE49-F238E27FC236}">
+                <a16:creationId xmlns:a16="http://schemas.microsoft.com/office/drawing/2014/main" id="{23BB7E73-E730-42EA-AACE-D1E323EA547E}"/>
+              </a:ext>
+              <a:ext uri="{C183D7F6-B498-43B3-948B-1728B52AA6E4}">
+                <adec:decorative xmlns:adec="http://schemas.microsoft.com/office/drawing/2017/decorative" val="1"/>
+              </a:ext>
+            </a:extLst>
+          </p:cNvPr>
+          <p:cNvSpPr>
+            <a:spLocks noGrp="1" noRot="1" noChangeAspect="1" noMove="1" noResize="1" noEditPoints="1" noAdjustHandles="1" noChangeArrowheads="1" noChangeShapeType="1" noTextEdit="1"/>
+          </p:cNvSpPr>
+          <p:nvPr>
+            <p:extLst>
+              <p:ext uri="{386F3935-93C4-4BCD-93E2-E3B085C9AB24}">
+                <p16:designElem xmlns:p16="http://schemas.microsoft.com/office/powerpoint/2015/main" val="1"/>
+              </p:ext>
+            </p:extLst>
+          </p:nvPr>
+        </p:nvSpPr>
+        <p:spPr>
+          <a:xfrm>
+            <a:off x="0" y="0"/>
+            <a:ext cx="12188952" cy="6858000"/>
+          </a:xfrm>
+          <a:prstGeom prst="rect">
+            <a:avLst/>
+          </a:prstGeom>
+          <a:ln>
+            <a:noFill/>
+          </a:ln>
+        </p:spPr>
+        <p:style>
+          <a:lnRef idx="2">
+            <a:schemeClr val="accent1">
+              <a:shade val="50000"/>
+            </a:schemeClr>
+          </a:lnRef>
+          <a:fillRef idx="1">
+            <a:schemeClr val="accent1"/>
+          </a:fillRef>
+          <a:effectRef idx="0">
+            <a:schemeClr val="accent1"/>
+          </a:effectRef>
+          <a:fontRef idx="minor">
+            <a:schemeClr val="lt1"/>
+          </a:fontRef>
+        </p:style>
+        <p:txBody>
+          <a:bodyPr rtlCol="0" anchor="ctr"/>
+          <a:lstStyle/>
+          <a:p>
+            <a:pPr algn="ctr"/>
+            <a:endParaRPr lang="en-US"/>
+          </a:p>
+        </p:txBody>
+      </p:sp>
+      <p:sp>
+        <p:nvSpPr>
+          <p:cNvPr id="2" name="Título 1">
+            <a:extLst>
+              <a:ext uri="{FF2B5EF4-FFF2-40B4-BE49-F238E27FC236}">
+                <a16:creationId xmlns:a16="http://schemas.microsoft.com/office/drawing/2014/main" id="{C1CE2670-65E5-749C-14EA-968FB66BC2C5}"/>
+              </a:ext>
+            </a:extLst>
+          </p:cNvPr>
+          <p:cNvSpPr>
+            <a:spLocks noGrp="1"/>
+          </p:cNvSpPr>
+          <p:nvPr>
+            <p:ph type="title"/>
+          </p:nvPr>
+        </p:nvSpPr>
+        <p:spPr>
+          <a:xfrm>
+            <a:off x="1908674" y="455362"/>
+            <a:ext cx="8695616" cy="571005"/>
+          </a:xfrm>
+        </p:spPr>
+        <p:txBody>
+          <a:bodyPr>
+            <a:noAutofit/>
+          </a:bodyPr>
+          <a:lstStyle/>
+          <a:p>
+            <a:r>
+              <a:rPr lang="pt-PT" sz="3200" dirty="0" err="1"/>
+              <a:t>Market</a:t>
+            </a:r>
+            <a:r>
+              <a:rPr lang="pt-PT" sz="3200" dirty="0"/>
+              <a:t> </a:t>
+            </a:r>
+            <a:r>
+              <a:rPr lang="pt-PT" sz="3200" dirty="0" err="1"/>
+              <a:t>Agent</a:t>
+            </a:r>
+            <a:endParaRPr lang="pt-PT" sz="3200" dirty="0"/>
+          </a:p>
+        </p:txBody>
+      </p:sp>
+      <p:sp>
+        <p:nvSpPr>
+          <p:cNvPr id="3" name="Marcador de Posição de Conteúdo 2">
+            <a:extLst>
+              <a:ext uri="{FF2B5EF4-FFF2-40B4-BE49-F238E27FC236}">
+                <a16:creationId xmlns:a16="http://schemas.microsoft.com/office/drawing/2014/main" id="{4AA3289D-F1AF-ACFB-7504-B14EDC4364C5}"/>
+              </a:ext>
+            </a:extLst>
+          </p:cNvPr>
+          <p:cNvSpPr>
+            <a:spLocks noGrp="1"/>
+          </p:cNvSpPr>
+          <p:nvPr>
+            <p:ph idx="1"/>
+          </p:nvPr>
+        </p:nvSpPr>
+        <p:spPr>
+          <a:xfrm>
+            <a:off x="1117600" y="1369762"/>
+            <a:ext cx="9486690" cy="4716406"/>
+          </a:xfrm>
+        </p:spPr>
+        <p:txBody>
+          <a:bodyPr>
+            <a:normAutofit/>
+          </a:bodyPr>
+          <a:lstStyle/>
+          <a:p>
+            <a:r>
+              <a:rPr lang="pt-PT" sz="1600" dirty="0"/>
+              <a:t>The agente </a:t>
+            </a:r>
+            <a:r>
+              <a:rPr lang="pt-PT" sz="1600" dirty="0" err="1"/>
+              <a:t>starts</a:t>
+            </a:r>
+            <a:r>
+              <a:rPr lang="pt-PT" sz="1600" dirty="0"/>
+              <a:t> </a:t>
+            </a:r>
+            <a:r>
+              <a:rPr lang="pt-PT" sz="1600" dirty="0" err="1"/>
+              <a:t>by</a:t>
+            </a:r>
+            <a:r>
+              <a:rPr lang="pt-PT" sz="1600" dirty="0"/>
+              <a:t> </a:t>
+            </a:r>
+            <a:r>
+              <a:rPr lang="pt-PT" sz="1600" dirty="0" err="1"/>
+              <a:t>loading</a:t>
+            </a:r>
+            <a:r>
+              <a:rPr lang="pt-PT" sz="1600" dirty="0"/>
+              <a:t> the data </a:t>
+            </a:r>
+            <a:r>
+              <a:rPr lang="pt-PT" sz="1600" dirty="0" err="1"/>
+              <a:t>from</a:t>
+            </a:r>
+            <a:r>
+              <a:rPr lang="pt-PT" sz="1600" dirty="0"/>
+              <a:t> the </a:t>
+            </a:r>
+            <a:r>
+              <a:rPr lang="pt-PT" sz="1600" i="1" dirty="0" err="1"/>
+              <a:t>json</a:t>
+            </a:r>
+            <a:r>
+              <a:rPr lang="pt-PT" sz="1600" dirty="0"/>
+              <a:t> file </a:t>
+            </a:r>
+            <a:r>
+              <a:rPr lang="pt-PT" sz="1600" dirty="0" err="1"/>
+              <a:t>and</a:t>
+            </a:r>
+            <a:r>
+              <a:rPr lang="pt-PT" sz="1600" dirty="0"/>
+              <a:t> </a:t>
+            </a:r>
+            <a:r>
+              <a:rPr lang="pt-PT" sz="1600" dirty="0" err="1"/>
+              <a:t>convert</a:t>
+            </a:r>
+            <a:r>
+              <a:rPr lang="pt-PT" sz="1600" dirty="0"/>
+              <a:t> it to a </a:t>
+            </a:r>
+            <a:r>
+              <a:rPr lang="pt-PT" sz="1600" dirty="0" err="1"/>
+              <a:t>list</a:t>
+            </a:r>
+            <a:r>
+              <a:rPr lang="pt-PT" sz="1600" dirty="0"/>
+              <a:t> </a:t>
+            </a:r>
+            <a:r>
+              <a:rPr lang="pt-PT" sz="1600" dirty="0" err="1"/>
+              <a:t>of</a:t>
+            </a:r>
+            <a:r>
+              <a:rPr lang="pt-PT" sz="1600" dirty="0"/>
+              <a:t> </a:t>
+            </a:r>
+            <a:r>
+              <a:rPr lang="pt-PT" sz="1600" dirty="0" err="1"/>
+              <a:t>lists</a:t>
+            </a:r>
+            <a:r>
+              <a:rPr lang="pt-PT" sz="1600" dirty="0"/>
+              <a:t> </a:t>
+            </a:r>
+            <a:r>
+              <a:rPr lang="pt-PT" sz="1600" dirty="0" err="1"/>
+              <a:t>of</a:t>
+            </a:r>
+            <a:r>
+              <a:rPr lang="pt-PT" sz="1600" dirty="0"/>
+              <a:t> </a:t>
+            </a:r>
+            <a:r>
+              <a:rPr lang="pt-PT" sz="1600" dirty="0" err="1"/>
+              <a:t>HashMaps</a:t>
+            </a:r>
+            <a:r>
+              <a:rPr lang="pt-PT" sz="1600" dirty="0"/>
+              <a:t>. </a:t>
+            </a:r>
+            <a:r>
+              <a:rPr lang="pt-PT" sz="1600" dirty="0" err="1"/>
+              <a:t>Each</a:t>
+            </a:r>
+            <a:r>
+              <a:rPr lang="pt-PT" sz="1600" dirty="0"/>
+              <a:t> </a:t>
+            </a:r>
+            <a:r>
+              <a:rPr lang="pt-PT" sz="1600" dirty="0" err="1"/>
+              <a:t>HashMap</a:t>
+            </a:r>
+            <a:r>
+              <a:rPr lang="pt-PT" sz="1600" dirty="0"/>
+              <a:t> </a:t>
+            </a:r>
+            <a:r>
+              <a:rPr lang="pt-PT" sz="1600" dirty="0" err="1"/>
+              <a:t>associates</a:t>
+            </a:r>
+            <a:r>
+              <a:rPr lang="pt-PT" sz="1600" dirty="0"/>
+              <a:t> a </a:t>
+            </a:r>
+            <a:r>
+              <a:rPr lang="pt-PT" sz="1600" dirty="0" err="1"/>
+              <a:t>ticker</a:t>
+            </a:r>
+            <a:r>
+              <a:rPr lang="pt-PT" sz="1600" dirty="0"/>
+              <a:t> with the </a:t>
+            </a:r>
+            <a:r>
+              <a:rPr lang="pt-PT" sz="1600" dirty="0" err="1"/>
+              <a:t>daily</a:t>
+            </a:r>
+            <a:r>
+              <a:rPr lang="pt-PT" sz="1600" dirty="0"/>
+              <a:t> </a:t>
+            </a:r>
+            <a:r>
+              <a:rPr lang="pt-PT" sz="1600" dirty="0" err="1"/>
+              <a:t>values</a:t>
+            </a:r>
+            <a:r>
+              <a:rPr lang="pt-PT" sz="1600" dirty="0"/>
+              <a:t>.</a:t>
+            </a:r>
+          </a:p>
+          <a:p>
+            <a:r>
+              <a:rPr lang="pt-PT" sz="1600" dirty="0"/>
+              <a:t>It is </a:t>
+            </a:r>
+            <a:r>
+              <a:rPr lang="pt-PT" sz="1600" dirty="0" err="1"/>
+              <a:t>composed</a:t>
+            </a:r>
+            <a:r>
+              <a:rPr lang="pt-PT" sz="1600" dirty="0"/>
+              <a:t> </a:t>
+            </a:r>
+            <a:r>
+              <a:rPr lang="pt-PT" sz="1600" dirty="0" err="1"/>
+              <a:t>of</a:t>
+            </a:r>
+            <a:r>
+              <a:rPr lang="pt-PT" sz="1600" dirty="0"/>
+              <a:t> </a:t>
+            </a:r>
+            <a:r>
+              <a:rPr lang="pt-PT" sz="1600" b="1" dirty="0" err="1"/>
+              <a:t>two</a:t>
+            </a:r>
+            <a:r>
+              <a:rPr lang="pt-PT" sz="1600" dirty="0"/>
+              <a:t> </a:t>
+            </a:r>
+            <a:r>
+              <a:rPr lang="pt-PT" sz="1600" dirty="0" err="1"/>
+              <a:t>behaviours</a:t>
+            </a:r>
+            <a:r>
+              <a:rPr lang="pt-PT" sz="1600" dirty="0"/>
+              <a:t>:</a:t>
+            </a:r>
+          </a:p>
+          <a:p>
+            <a:pPr marL="0" indent="0">
+              <a:buNone/>
+            </a:pPr>
+            <a:endParaRPr lang="pt-PT" sz="1600" dirty="0"/>
+          </a:p>
+          <a:p>
+            <a:r>
+              <a:rPr lang="pt-PT" sz="1600" b="1" dirty="0" err="1"/>
+              <a:t>SubscriptionRequestsBehavior</a:t>
+            </a:r>
+            <a:r>
+              <a:rPr lang="pt-PT" sz="1600" dirty="0"/>
+              <a:t>:</a:t>
+            </a:r>
+          </a:p>
+          <a:p>
+            <a:pPr lvl="1"/>
+            <a:r>
+              <a:rPr lang="pt-PT" sz="1300" dirty="0"/>
+              <a:t>It </a:t>
+            </a:r>
+            <a:r>
+              <a:rPr lang="pt-PT" sz="1300" dirty="0" err="1"/>
+              <a:t>extends</a:t>
+            </a:r>
+            <a:r>
+              <a:rPr lang="pt-PT" sz="1300" dirty="0"/>
+              <a:t> </a:t>
+            </a:r>
+            <a:r>
+              <a:rPr lang="pt-PT" sz="1300" b="1" dirty="0" err="1"/>
+              <a:t>CyclicBehaviour</a:t>
+            </a:r>
+            <a:r>
+              <a:rPr lang="pt-PT" sz="1300" dirty="0"/>
+              <a:t>, </a:t>
+            </a:r>
+            <a:r>
+              <a:rPr lang="pt-PT" sz="1300" dirty="0" err="1"/>
+              <a:t>which</a:t>
+            </a:r>
+            <a:r>
+              <a:rPr lang="pt-PT" sz="1300" dirty="0"/>
+              <a:t> is a </a:t>
+            </a:r>
+            <a:r>
+              <a:rPr lang="pt-PT" sz="1300" dirty="0" err="1"/>
+              <a:t>behaviour</a:t>
+            </a:r>
+            <a:r>
+              <a:rPr lang="pt-PT" sz="1300" dirty="0"/>
+              <a:t> that is </a:t>
+            </a:r>
+            <a:r>
+              <a:rPr lang="pt-PT" sz="1300" dirty="0" err="1"/>
+              <a:t>always</a:t>
+            </a:r>
+            <a:r>
+              <a:rPr lang="pt-PT" sz="1300" dirty="0"/>
+              <a:t> </a:t>
+            </a:r>
+            <a:r>
+              <a:rPr lang="pt-PT" sz="1300" dirty="0" err="1"/>
+              <a:t>running</a:t>
+            </a:r>
+            <a:r>
+              <a:rPr lang="pt-PT" sz="1300" dirty="0"/>
+              <a:t> in </a:t>
+            </a:r>
+            <a:r>
+              <a:rPr lang="pt-PT" sz="1300" dirty="0" err="1"/>
+              <a:t>loop</a:t>
+            </a:r>
+            <a:r>
+              <a:rPr lang="pt-PT" sz="1300" dirty="0"/>
+              <a:t>.</a:t>
+            </a:r>
+          </a:p>
+          <a:p>
+            <a:pPr lvl="1"/>
+            <a:r>
+              <a:rPr lang="pt-PT" sz="1300" dirty="0"/>
+              <a:t>That </a:t>
+            </a:r>
+            <a:r>
+              <a:rPr lang="pt-PT" sz="1300" dirty="0" err="1"/>
+              <a:t>way</a:t>
+            </a:r>
+            <a:r>
+              <a:rPr lang="pt-PT" sz="1300" dirty="0"/>
+              <a:t>, is </a:t>
+            </a:r>
+            <a:r>
+              <a:rPr lang="pt-PT" sz="1300" dirty="0" err="1"/>
+              <a:t>always</a:t>
+            </a:r>
+            <a:r>
+              <a:rPr lang="pt-PT" sz="1300" dirty="0"/>
+              <a:t> open to </a:t>
+            </a:r>
+            <a:r>
+              <a:rPr lang="pt-PT" sz="1300" dirty="0" err="1"/>
+              <a:t>receive</a:t>
+            </a:r>
+            <a:r>
+              <a:rPr lang="pt-PT" sz="1300" dirty="0"/>
+              <a:t> </a:t>
+            </a:r>
+            <a:r>
+              <a:rPr lang="pt-PT" sz="1300" dirty="0" err="1"/>
+              <a:t>subscriptions</a:t>
+            </a:r>
+            <a:r>
+              <a:rPr lang="pt-PT" sz="1300" dirty="0"/>
+              <a:t> </a:t>
+            </a:r>
+            <a:r>
+              <a:rPr lang="pt-PT" sz="1300" dirty="0" err="1"/>
+              <a:t>from</a:t>
+            </a:r>
+            <a:r>
+              <a:rPr lang="pt-PT" sz="1300" dirty="0"/>
+              <a:t> </a:t>
+            </a:r>
+            <a:r>
+              <a:rPr lang="pt-PT" sz="1300" dirty="0" err="1"/>
+              <a:t>new</a:t>
+            </a:r>
+            <a:r>
+              <a:rPr lang="pt-PT" sz="1300" dirty="0"/>
+              <a:t> </a:t>
+            </a:r>
+            <a:r>
+              <a:rPr lang="pt-PT" sz="1300" dirty="0" err="1"/>
+              <a:t>traders</a:t>
+            </a:r>
+            <a:r>
+              <a:rPr lang="pt-PT" sz="1300" dirty="0"/>
+              <a:t>.</a:t>
+            </a:r>
+          </a:p>
+          <a:p>
+            <a:pPr marL="228600" lvl="1" indent="0">
+              <a:buNone/>
+            </a:pPr>
+            <a:endParaRPr lang="pt-PT" sz="1300" dirty="0"/>
+          </a:p>
+          <a:p>
+            <a:r>
+              <a:rPr lang="pt-PT" sz="1600" b="1" dirty="0" err="1"/>
+              <a:t>TickerBehaviour</a:t>
+            </a:r>
+            <a:r>
+              <a:rPr lang="pt-PT" sz="1600" dirty="0"/>
+              <a:t>:</a:t>
+            </a:r>
+          </a:p>
+          <a:p>
+            <a:pPr lvl="1"/>
+            <a:r>
+              <a:rPr lang="pt-PT" sz="1300" dirty="0"/>
+              <a:t>This </a:t>
+            </a:r>
+            <a:r>
+              <a:rPr lang="pt-PT" sz="1300" dirty="0" err="1"/>
+              <a:t>behaviour</a:t>
+            </a:r>
+            <a:r>
+              <a:rPr lang="pt-PT" sz="1300" dirty="0"/>
+              <a:t> is </a:t>
+            </a:r>
+            <a:r>
+              <a:rPr lang="pt-PT" sz="1300" dirty="0" err="1"/>
+              <a:t>used</a:t>
+            </a:r>
+            <a:r>
+              <a:rPr lang="pt-PT" sz="1300" dirty="0"/>
+              <a:t> to </a:t>
+            </a:r>
+            <a:r>
+              <a:rPr lang="pt-PT" sz="1300" dirty="0" err="1"/>
+              <a:t>send</a:t>
+            </a:r>
+            <a:r>
+              <a:rPr lang="pt-PT" sz="1300" dirty="0"/>
+              <a:t> the </a:t>
+            </a:r>
+            <a:r>
+              <a:rPr lang="pt-PT" sz="1300" dirty="0" err="1"/>
+              <a:t>daily</a:t>
+            </a:r>
+            <a:r>
+              <a:rPr lang="pt-PT" sz="1300" dirty="0"/>
+              <a:t> </a:t>
+            </a:r>
+            <a:r>
+              <a:rPr lang="pt-PT" sz="1300" dirty="0" err="1"/>
+              <a:t>prices</a:t>
+            </a:r>
+            <a:r>
+              <a:rPr lang="pt-PT" sz="1300" dirty="0"/>
+              <a:t> </a:t>
+            </a:r>
+            <a:r>
+              <a:rPr lang="pt-PT" sz="1300" dirty="0" err="1"/>
+              <a:t>list</a:t>
+            </a:r>
+            <a:r>
+              <a:rPr lang="pt-PT" sz="1300" dirty="0"/>
+              <a:t> to the </a:t>
+            </a:r>
+            <a:r>
+              <a:rPr lang="pt-PT" sz="1300" dirty="0" err="1"/>
+              <a:t>traders</a:t>
+            </a:r>
+            <a:r>
+              <a:rPr lang="pt-PT" sz="1300" dirty="0"/>
+              <a:t> that have </a:t>
+            </a:r>
+            <a:r>
+              <a:rPr lang="pt-PT" sz="1300" dirty="0" err="1"/>
+              <a:t>subscribed</a:t>
+            </a:r>
+            <a:r>
+              <a:rPr lang="pt-PT" sz="1300" dirty="0"/>
+              <a:t> to the </a:t>
+            </a:r>
+            <a:r>
+              <a:rPr lang="pt-PT" sz="1300" dirty="0" err="1"/>
+              <a:t>market</a:t>
+            </a:r>
+            <a:r>
+              <a:rPr lang="pt-PT" sz="1300" dirty="0"/>
+              <a:t>.</a:t>
+            </a:r>
+          </a:p>
+          <a:p>
+            <a:pPr lvl="1"/>
+            <a:r>
+              <a:rPr lang="pt-PT" sz="1300" dirty="0"/>
+              <a:t>The </a:t>
+            </a:r>
+            <a:r>
+              <a:rPr lang="pt-PT" sz="1300" dirty="0" err="1"/>
+              <a:t>period</a:t>
+            </a:r>
+            <a:r>
+              <a:rPr lang="pt-PT" sz="1300" dirty="0"/>
+              <a:t> is set to 1 </a:t>
+            </a:r>
+            <a:r>
+              <a:rPr lang="pt-PT" sz="1300" dirty="0" err="1"/>
+              <a:t>second</a:t>
+            </a:r>
+            <a:r>
+              <a:rPr lang="pt-PT" sz="1300" dirty="0"/>
+              <a:t>, so, </a:t>
+            </a:r>
+            <a:r>
+              <a:rPr lang="pt-PT" sz="1300" dirty="0" err="1"/>
+              <a:t>at</a:t>
+            </a:r>
+            <a:r>
+              <a:rPr lang="pt-PT" sz="1300" dirty="0"/>
+              <a:t> </a:t>
+            </a:r>
+            <a:r>
+              <a:rPr lang="pt-PT" sz="1300" dirty="0" err="1"/>
+              <a:t>each</a:t>
+            </a:r>
+            <a:r>
+              <a:rPr lang="pt-PT" sz="1300" dirty="0"/>
+              <a:t> </a:t>
+            </a:r>
+            <a:r>
+              <a:rPr lang="pt-PT" sz="1300" dirty="0" err="1"/>
+              <a:t>second</a:t>
+            </a:r>
+            <a:r>
+              <a:rPr lang="pt-PT" sz="1300" dirty="0"/>
+              <a:t> it </a:t>
+            </a:r>
+            <a:r>
+              <a:rPr lang="pt-PT" sz="1300" dirty="0" err="1"/>
+              <a:t>sends</a:t>
+            </a:r>
+            <a:r>
+              <a:rPr lang="pt-PT" sz="1300" dirty="0"/>
+              <a:t> </a:t>
+            </a:r>
+            <a:r>
+              <a:rPr lang="pt-PT" sz="1300" dirty="0" err="1"/>
+              <a:t>new</a:t>
+            </a:r>
+            <a:r>
+              <a:rPr lang="pt-PT" sz="1300" dirty="0"/>
+              <a:t> </a:t>
+            </a:r>
+            <a:r>
+              <a:rPr lang="pt-PT" sz="1300" dirty="0" err="1"/>
+              <a:t>daily</a:t>
+            </a:r>
+            <a:r>
+              <a:rPr lang="pt-PT" sz="1300" dirty="0"/>
+              <a:t> </a:t>
+            </a:r>
+            <a:r>
+              <a:rPr lang="pt-PT" sz="1300" dirty="0" err="1"/>
+              <a:t>information</a:t>
+            </a:r>
+            <a:r>
+              <a:rPr lang="pt-PT" sz="1300" dirty="0"/>
+              <a:t>.</a:t>
+            </a:r>
+          </a:p>
+          <a:p>
+            <a:pPr lvl="1"/>
+            <a:r>
+              <a:rPr lang="pt-PT" sz="1300" dirty="0" err="1"/>
+              <a:t>When</a:t>
+            </a:r>
+            <a:r>
+              <a:rPr lang="pt-PT" sz="1300" dirty="0"/>
+              <a:t> it </a:t>
+            </a:r>
+            <a:r>
+              <a:rPr lang="pt-PT" sz="1300" dirty="0" err="1"/>
+              <a:t>reaches</a:t>
+            </a:r>
+            <a:r>
+              <a:rPr lang="pt-PT" sz="1300" dirty="0"/>
+              <a:t> the </a:t>
+            </a:r>
+            <a:r>
+              <a:rPr lang="pt-PT" sz="1300" dirty="0" err="1"/>
+              <a:t>last</a:t>
+            </a:r>
+            <a:r>
+              <a:rPr lang="pt-PT" sz="1300" dirty="0"/>
+              <a:t> </a:t>
+            </a:r>
+            <a:r>
+              <a:rPr lang="pt-PT" sz="1300" dirty="0" err="1"/>
+              <a:t>day</a:t>
+            </a:r>
+            <a:r>
+              <a:rPr lang="pt-PT" sz="1300" dirty="0"/>
+              <a:t>, it </a:t>
+            </a:r>
+            <a:r>
+              <a:rPr lang="pt-PT" sz="1300" dirty="0" err="1"/>
+              <a:t>sends</a:t>
+            </a:r>
+            <a:r>
+              <a:rPr lang="pt-PT" sz="1300" dirty="0"/>
+              <a:t> a </a:t>
+            </a:r>
+            <a:r>
+              <a:rPr lang="pt-PT" sz="1300" dirty="0" err="1"/>
+              <a:t>special</a:t>
+            </a:r>
+            <a:r>
+              <a:rPr lang="pt-PT" sz="1300" dirty="0"/>
+              <a:t> </a:t>
+            </a:r>
+            <a:r>
+              <a:rPr lang="pt-PT" sz="1300" dirty="0" err="1"/>
+              <a:t>message</a:t>
+            </a:r>
+            <a:r>
+              <a:rPr lang="pt-PT" sz="1300" dirty="0"/>
+              <a:t>, “</a:t>
+            </a:r>
+            <a:r>
+              <a:rPr lang="pt-PT" sz="1300" i="1" dirty="0"/>
+              <a:t>NO_MORE_DAYS</a:t>
+            </a:r>
+            <a:r>
+              <a:rPr lang="pt-PT" sz="1300" dirty="0"/>
+              <a:t>”.</a:t>
+            </a:r>
+          </a:p>
+        </p:txBody>
+      </p:sp>
+      <p:sp>
+        <p:nvSpPr>
+          <p:cNvPr id="10" name="Rectangle 9">
+            <a:extLst>
+              <a:ext uri="{FF2B5EF4-FFF2-40B4-BE49-F238E27FC236}">
+                <a16:creationId xmlns:a16="http://schemas.microsoft.com/office/drawing/2014/main" id="{F1F6C2E9-B316-4410-88E5-74F044FC3575}"/>
+              </a:ext>
+              <a:ext uri="{C183D7F6-B498-43B3-948B-1728B52AA6E4}">
+                <adec:decorative xmlns:adec="http://schemas.microsoft.com/office/drawing/2017/decorative" val="1"/>
+              </a:ext>
+            </a:extLst>
+          </p:cNvPr>
+          <p:cNvSpPr>
+            <a:spLocks noGrp="1" noRot="1" noChangeAspect="1" noMove="1" noResize="1" noEditPoints="1" noAdjustHandles="1" noChangeArrowheads="1" noChangeShapeType="1" noTextEdit="1"/>
+          </p:cNvSpPr>
+          <p:nvPr>
+            <p:extLst>
+              <p:ext uri="{386F3935-93C4-4BCD-93E2-E3B085C9AB24}">
+                <p16:designElem xmlns:p16="http://schemas.microsoft.com/office/powerpoint/2015/main" val="1"/>
+              </p:ext>
+            </p:extLst>
+          </p:nvPr>
+        </p:nvSpPr>
+        <p:spPr>
+          <a:xfrm>
+            <a:off x="11058144" y="565153"/>
+            <a:ext cx="1133856" cy="6292847"/>
+          </a:xfrm>
+          <a:prstGeom prst="rect">
+            <a:avLst/>
+          </a:prstGeom>
+          <a:gradFill flip="none" rotWithShape="1">
+            <a:gsLst>
+              <a:gs pos="0">
+                <a:schemeClr val="accent1">
+                  <a:alpha val="50000"/>
+                </a:schemeClr>
+              </a:gs>
+              <a:gs pos="81000">
+                <a:schemeClr val="accent4">
+                  <a:alpha val="50000"/>
+                </a:schemeClr>
+              </a:gs>
+              <a:gs pos="25000">
+                <a:schemeClr val="accent2">
+                  <a:alpha val="60000"/>
+                </a:schemeClr>
+              </a:gs>
+              <a:gs pos="50000">
+                <a:schemeClr val="accent3">
+                  <a:alpha val="55000"/>
+                </a:schemeClr>
+              </a:gs>
+              <a:gs pos="99000">
+                <a:schemeClr val="accent5">
+                  <a:alpha val="50000"/>
+                </a:schemeClr>
+              </a:gs>
+            </a:gsLst>
+            <a:path path="circle">
+              <a:fillToRect r="100000" b="100000"/>
+            </a:path>
+            <a:tileRect l="-100000" t="-100000"/>
+          </a:gradFill>
+          <a:ln>
+            <a:noFill/>
+          </a:ln>
+        </p:spPr>
+        <p:style>
+          <a:lnRef idx="2">
+            <a:schemeClr val="accent1">
+              <a:shade val="50000"/>
+            </a:schemeClr>
+          </a:lnRef>
+          <a:fillRef idx="1">
+            <a:schemeClr val="accent1"/>
+          </a:fillRef>
+          <a:effectRef idx="0">
+            <a:schemeClr val="accent1"/>
+          </a:effectRef>
+          <a:fontRef idx="minor">
+            <a:schemeClr val="lt1"/>
+          </a:fontRef>
+        </p:style>
+        <p:txBody>
+          <a:bodyPr rtlCol="0" anchor="ctr"/>
+          <a:lstStyle/>
+          <a:p>
+            <a:pPr algn="ctr"/>
+            <a:endParaRPr lang="en-US"/>
+          </a:p>
+        </p:txBody>
+      </p:sp>
+      <p:sp>
+        <p:nvSpPr>
+          <p:cNvPr id="12" name="Rectangle 11">
+            <a:extLst>
+              <a:ext uri="{FF2B5EF4-FFF2-40B4-BE49-F238E27FC236}">
+                <a16:creationId xmlns:a16="http://schemas.microsoft.com/office/drawing/2014/main" id="{83D07262-43A6-451F-9B19-77B943C6399D}"/>
+              </a:ext>
+              <a:ext uri="{C183D7F6-B498-43B3-948B-1728B52AA6E4}">
+                <adec:decorative xmlns:adec="http://schemas.microsoft.com/office/drawing/2017/decorative" val="1"/>
+              </a:ext>
+            </a:extLst>
+          </p:cNvPr>
+          <p:cNvSpPr>
+            <a:spLocks noGrp="1" noRot="1" noChangeAspect="1" noMove="1" noResize="1" noEditPoints="1" noAdjustHandles="1" noChangeArrowheads="1" noChangeShapeType="1" noTextEdit="1"/>
+          </p:cNvSpPr>
+          <p:nvPr>
+            <p:extLst>
+              <p:ext uri="{386F3935-93C4-4BCD-93E2-E3B085C9AB24}">
+                <p16:designElem xmlns:p16="http://schemas.microsoft.com/office/powerpoint/2015/main" val="1"/>
+              </p:ext>
+            </p:extLst>
+          </p:nvPr>
+        </p:nvSpPr>
+        <p:spPr>
+          <a:xfrm>
+            <a:off x="11626850" y="1"/>
+            <a:ext cx="565150" cy="6857999"/>
+          </a:xfrm>
+          <a:prstGeom prst="rect">
+            <a:avLst/>
+          </a:prstGeom>
+          <a:gradFill flip="none" rotWithShape="1">
+            <a:gsLst>
+              <a:gs pos="0">
+                <a:schemeClr val="accent1">
+                  <a:alpha val="50000"/>
+                </a:schemeClr>
+              </a:gs>
+              <a:gs pos="81000">
+                <a:schemeClr val="accent4">
+                  <a:alpha val="50000"/>
+                </a:schemeClr>
+              </a:gs>
+              <a:gs pos="25000">
+                <a:schemeClr val="accent2">
+                  <a:alpha val="60000"/>
+                </a:schemeClr>
+              </a:gs>
+              <a:gs pos="49000">
+                <a:schemeClr val="accent3">
+                  <a:alpha val="55000"/>
+                </a:schemeClr>
+              </a:gs>
+              <a:gs pos="99000">
+                <a:schemeClr val="accent5">
+                  <a:alpha val="50000"/>
+                </a:schemeClr>
+              </a:gs>
+            </a:gsLst>
+            <a:path path="circle">
+              <a:fillToRect r="100000" b="100000"/>
+            </a:path>
+            <a:tileRect l="-100000" t="-100000"/>
+          </a:gradFill>
+          <a:ln>
+            <a:noFill/>
+          </a:ln>
+        </p:spPr>
+        <p:style>
+          <a:lnRef idx="2">
+            <a:schemeClr val="accent1">
+              <a:shade val="50000"/>
+            </a:schemeClr>
+          </a:lnRef>
+          <a:fillRef idx="1">
+            <a:schemeClr val="accent1"/>
+          </a:fillRef>
+          <a:effectRef idx="0">
+            <a:schemeClr val="accent1"/>
+          </a:effectRef>
+          <a:fontRef idx="minor">
+            <a:schemeClr val="lt1"/>
+          </a:fontRef>
+        </p:style>
+        <p:txBody>
+          <a:bodyPr rtlCol="0" anchor="ctr"/>
+          <a:lstStyle/>
+          <a:p>
+            <a:pPr algn="ctr"/>
+            <a:endParaRPr lang="en-US"/>
+          </a:p>
+        </p:txBody>
+      </p:sp>
+      <p:pic>
+        <p:nvPicPr>
+          <p:cNvPr id="5" name="Gráfico 4" descr="Jornal com preenchimento sólido">
+            <a:extLst>
+              <a:ext uri="{FF2B5EF4-FFF2-40B4-BE49-F238E27FC236}">
+                <a16:creationId xmlns:a16="http://schemas.microsoft.com/office/drawing/2014/main" id="{B60BB1E8-B4B0-A6CF-81CF-6AF3F91527C4}"/>
+              </a:ext>
+            </a:extLst>
+          </p:cNvPr>
+          <p:cNvPicPr>
+            <a:picLocks noChangeAspect="1"/>
+          </p:cNvPicPr>
+          <p:nvPr/>
+        </p:nvPicPr>
+        <p:blipFill>
+          <a:blip r:embed="rId2">
+            <a:extLst>
+              <a:ext uri="{28A0092B-C50C-407E-A947-70E740481C1C}">
+                <a14:useLocalDpi xmlns:a14="http://schemas.microsoft.com/office/drawing/2010/main" val="0"/>
+              </a:ext>
+              <a:ext uri="{96DAC541-7B7A-43D3-8B79-37D633B846F1}">
+                <asvg:svgBlip xmlns:asvg="http://schemas.microsoft.com/office/drawing/2016/SVG/main" r:embed="rId3"/>
+              </a:ext>
+            </a:extLst>
+          </a:blip>
+          <a:stretch>
+            <a:fillRect/>
+          </a:stretch>
+        </p:blipFill>
+        <p:spPr>
+          <a:xfrm>
+            <a:off x="994274" y="283664"/>
+            <a:ext cx="914400" cy="914400"/>
+          </a:xfrm>
+          <a:prstGeom prst="rect">
+            <a:avLst/>
+          </a:prstGeom>
+        </p:spPr>
+      </p:pic>
+    </p:spTree>
+    <p:extLst>
+      <p:ext uri="{BB962C8B-B14F-4D97-AF65-F5344CB8AC3E}">
+        <p14:creationId xmlns:p14="http://schemas.microsoft.com/office/powerpoint/2010/main" val="408682577"/>
+      </p:ext>
+    </p:extLst>
+  </p:cSld>
+  <p:clrMapOvr>
+    <a:masterClrMapping/>
+  </p:clrMapOvr>
+</p:sld>
+</file>
+
+<file path=ppt/slides/slide6.xml><?xml version="1.0" encoding="utf-8"?>
+<p:sld xmlns:a="http://schemas.openxmlformats.org/drawingml/2006/main" xmlns:r="http://schemas.openxmlformats.org/officeDocument/2006/relationships" xmlns:p="http://schemas.openxmlformats.org/presentationml/2006/main">
+  <p:cSld>
+    <p:bg>
+      <p:bgPr>
+        <a:solidFill>
+          <a:schemeClr val="bg1"/>
+        </a:solidFill>
+        <a:effectLst/>
+      </p:bgPr>
+    </p:bg>
+    <p:spTree>
+      <p:nvGrpSpPr>
+        <p:cNvPr id="1" name=""/>
+        <p:cNvGrpSpPr/>
+        <p:nvPr/>
+      </p:nvGrpSpPr>
+      <p:grpSpPr>
+        <a:xfrm>
+          <a:off x="0" y="0"/>
+          <a:ext cx="0" cy="0"/>
+          <a:chOff x="0" y="0"/>
+          <a:chExt cx="0" cy="0"/>
+        </a:xfrm>
+      </p:grpSpPr>
+      <p:sp useBgFill="1">
+        <p:nvSpPr>
+          <p:cNvPr id="8" name="Rectangle 7">
+            <a:extLst>
+              <a:ext uri="{FF2B5EF4-FFF2-40B4-BE49-F238E27FC236}">
+                <a16:creationId xmlns:a16="http://schemas.microsoft.com/office/drawing/2014/main" id="{23BB7E73-E730-42EA-AACE-D1E323EA547E}"/>
+              </a:ext>
+              <a:ext uri="{C183D7F6-B498-43B3-948B-1728B52AA6E4}">
+                <adec:decorative xmlns:adec="http://schemas.microsoft.com/office/drawing/2017/decorative" val="1"/>
+              </a:ext>
+            </a:extLst>
+          </p:cNvPr>
+          <p:cNvSpPr>
+            <a:spLocks noGrp="1" noRot="1" noChangeAspect="1" noMove="1" noResize="1" noEditPoints="1" noAdjustHandles="1" noChangeArrowheads="1" noChangeShapeType="1" noTextEdit="1"/>
+          </p:cNvSpPr>
+          <p:nvPr>
+            <p:extLst>
+              <p:ext uri="{386F3935-93C4-4BCD-93E2-E3B085C9AB24}">
+                <p16:designElem xmlns:p16="http://schemas.microsoft.com/office/powerpoint/2015/main" val="1"/>
+              </p:ext>
+            </p:extLst>
+          </p:nvPr>
+        </p:nvSpPr>
+        <p:spPr>
+          <a:xfrm>
+            <a:off x="0" y="0"/>
+            <a:ext cx="12188952" cy="6858000"/>
+          </a:xfrm>
+          <a:prstGeom prst="rect">
+            <a:avLst/>
+          </a:prstGeom>
+          <a:ln>
+            <a:noFill/>
+          </a:ln>
+        </p:spPr>
+        <p:style>
+          <a:lnRef idx="2">
+            <a:schemeClr val="accent1">
+              <a:shade val="50000"/>
+            </a:schemeClr>
+          </a:lnRef>
+          <a:fillRef idx="1">
+            <a:schemeClr val="accent1"/>
+          </a:fillRef>
+          <a:effectRef idx="0">
+            <a:schemeClr val="accent1"/>
+          </a:effectRef>
+          <a:fontRef idx="minor">
+            <a:schemeClr val="lt1"/>
+          </a:fontRef>
+        </p:style>
+        <p:txBody>
+          <a:bodyPr rtlCol="0" anchor="ctr"/>
+          <a:lstStyle/>
+          <a:p>
+            <a:pPr algn="ctr"/>
+            <a:endParaRPr lang="en-US"/>
+          </a:p>
+        </p:txBody>
+      </p:sp>
+      <p:sp>
+        <p:nvSpPr>
+          <p:cNvPr id="2" name="Título 1">
+            <a:extLst>
+              <a:ext uri="{FF2B5EF4-FFF2-40B4-BE49-F238E27FC236}">
+                <a16:creationId xmlns:a16="http://schemas.microsoft.com/office/drawing/2014/main" id="{C1CE2670-65E5-749C-14EA-968FB66BC2C5}"/>
+              </a:ext>
+            </a:extLst>
+          </p:cNvPr>
+          <p:cNvSpPr>
+            <a:spLocks noGrp="1"/>
+          </p:cNvSpPr>
+          <p:nvPr>
+            <p:ph type="title"/>
+          </p:nvPr>
+        </p:nvSpPr>
+        <p:spPr>
+          <a:xfrm>
+            <a:off x="1908674" y="455362"/>
+            <a:ext cx="8695616" cy="571005"/>
+          </a:xfrm>
+        </p:spPr>
+        <p:txBody>
+          <a:bodyPr>
+            <a:noAutofit/>
+          </a:bodyPr>
+          <a:lstStyle/>
+          <a:p>
+            <a:r>
+              <a:rPr lang="pt-PT" sz="3200" dirty="0" err="1"/>
+              <a:t>Trader</a:t>
+            </a:r>
+            <a:r>
+              <a:rPr lang="pt-PT" sz="3200" dirty="0"/>
+              <a:t> </a:t>
+            </a:r>
+            <a:r>
+              <a:rPr lang="pt-PT" sz="3200" dirty="0" err="1"/>
+              <a:t>Agent</a:t>
+            </a:r>
+            <a:endParaRPr lang="pt-PT" sz="3200" dirty="0"/>
+          </a:p>
+        </p:txBody>
+      </p:sp>
+      <p:sp>
+        <p:nvSpPr>
+          <p:cNvPr id="3" name="Marcador de Posição de Conteúdo 2">
+            <a:extLst>
+              <a:ext uri="{FF2B5EF4-FFF2-40B4-BE49-F238E27FC236}">
+                <a16:creationId xmlns:a16="http://schemas.microsoft.com/office/drawing/2014/main" id="{4AA3289D-F1AF-ACFB-7504-B14EDC4364C5}"/>
+              </a:ext>
+            </a:extLst>
+          </p:cNvPr>
+          <p:cNvSpPr>
+            <a:spLocks noGrp="1"/>
+          </p:cNvSpPr>
+          <p:nvPr>
+            <p:ph idx="1"/>
+          </p:nvPr>
+        </p:nvSpPr>
+        <p:spPr>
+          <a:xfrm>
+            <a:off x="1117600" y="1257795"/>
+            <a:ext cx="9486690" cy="4828373"/>
+          </a:xfrm>
+        </p:spPr>
+        <p:txBody>
+          <a:bodyPr>
+            <a:normAutofit/>
+          </a:bodyPr>
+          <a:lstStyle/>
+          <a:p>
+            <a:r>
+              <a:rPr lang="pt-PT" sz="1600" dirty="0"/>
+              <a:t>This </a:t>
+            </a:r>
+            <a:r>
+              <a:rPr lang="pt-PT" sz="1600" dirty="0" err="1"/>
+              <a:t>agent</a:t>
+            </a:r>
+            <a:r>
+              <a:rPr lang="pt-PT" sz="1600" dirty="0"/>
+              <a:t> </a:t>
+            </a:r>
+            <a:r>
+              <a:rPr lang="pt-PT" sz="1600" dirty="0" err="1"/>
+              <a:t>starts</a:t>
+            </a:r>
+            <a:r>
+              <a:rPr lang="pt-PT" sz="1600" dirty="0"/>
+              <a:t> </a:t>
+            </a:r>
+            <a:r>
+              <a:rPr lang="pt-PT" sz="1600" dirty="0" err="1"/>
+              <a:t>by</a:t>
+            </a:r>
+            <a:r>
+              <a:rPr lang="pt-PT" sz="1600" dirty="0"/>
+              <a:t> </a:t>
+            </a:r>
+            <a:r>
+              <a:rPr lang="pt-PT" sz="1600" dirty="0" err="1"/>
+              <a:t>sending</a:t>
+            </a:r>
+            <a:r>
+              <a:rPr lang="pt-PT" sz="1600" dirty="0"/>
+              <a:t> the </a:t>
+            </a:r>
+            <a:r>
+              <a:rPr lang="pt-PT" sz="1600" dirty="0" err="1"/>
+              <a:t>subscription</a:t>
+            </a:r>
+            <a:r>
+              <a:rPr lang="pt-PT" sz="1600" dirty="0"/>
+              <a:t> </a:t>
+            </a:r>
+            <a:r>
+              <a:rPr lang="pt-PT" sz="1600" dirty="0" err="1"/>
+              <a:t>message</a:t>
+            </a:r>
+            <a:r>
+              <a:rPr lang="pt-PT" sz="1600" dirty="0"/>
+              <a:t> to the </a:t>
+            </a:r>
+            <a:r>
+              <a:rPr lang="pt-PT" sz="1600" dirty="0" err="1"/>
+              <a:t>Market</a:t>
+            </a:r>
+            <a:r>
+              <a:rPr lang="pt-PT" sz="1600" dirty="0"/>
+              <a:t> </a:t>
+            </a:r>
+            <a:r>
+              <a:rPr lang="pt-PT" sz="1600" dirty="0" err="1"/>
+              <a:t>Agent</a:t>
+            </a:r>
+            <a:r>
+              <a:rPr lang="pt-PT" sz="1600" dirty="0"/>
+              <a:t> in the </a:t>
+            </a:r>
+            <a:r>
+              <a:rPr lang="pt-PT" sz="1600" dirty="0" err="1"/>
+              <a:t>setup</a:t>
+            </a:r>
+            <a:r>
+              <a:rPr lang="pt-PT" sz="1600" dirty="0"/>
+              <a:t> </a:t>
+            </a:r>
+            <a:r>
+              <a:rPr lang="pt-PT" sz="1600" dirty="0" err="1"/>
+              <a:t>and</a:t>
+            </a:r>
+            <a:r>
+              <a:rPr lang="pt-PT" sz="1600" dirty="0"/>
+              <a:t> </a:t>
+            </a:r>
+            <a:r>
+              <a:rPr lang="pt-PT" sz="1600" dirty="0" err="1"/>
+              <a:t>then</a:t>
+            </a:r>
+            <a:r>
+              <a:rPr lang="pt-PT" sz="1600" dirty="0"/>
+              <a:t> it </a:t>
+            </a:r>
+            <a:r>
+              <a:rPr lang="pt-PT" sz="1600" dirty="0" err="1"/>
+              <a:t>only</a:t>
+            </a:r>
+            <a:r>
+              <a:rPr lang="pt-PT" sz="1600" dirty="0"/>
+              <a:t> </a:t>
+            </a:r>
+            <a:r>
+              <a:rPr lang="pt-PT" sz="1600" dirty="0" err="1"/>
+              <a:t>has</a:t>
+            </a:r>
+            <a:r>
+              <a:rPr lang="pt-PT" sz="1600" dirty="0"/>
+              <a:t> </a:t>
+            </a:r>
+            <a:r>
+              <a:rPr lang="pt-PT" sz="1600" dirty="0" err="1"/>
+              <a:t>one</a:t>
+            </a:r>
+            <a:r>
+              <a:rPr lang="pt-PT" sz="1600" dirty="0"/>
+              <a:t> </a:t>
+            </a:r>
+            <a:r>
+              <a:rPr lang="pt-PT" sz="1600" dirty="0" err="1"/>
+              <a:t>behaviour</a:t>
+            </a:r>
+            <a:r>
+              <a:rPr lang="pt-PT" sz="1600" dirty="0"/>
+              <a:t>.</a:t>
+            </a:r>
+          </a:p>
+          <a:p>
+            <a:pPr marL="0" indent="0">
+              <a:buNone/>
+            </a:pPr>
+            <a:endParaRPr lang="pt-PT" sz="1600" dirty="0"/>
+          </a:p>
+          <a:p>
+            <a:r>
+              <a:rPr lang="pt-PT" sz="1600" b="1" dirty="0" err="1"/>
+              <a:t>ExecuteStrategyDispatcher</a:t>
+            </a:r>
+            <a:r>
+              <a:rPr lang="pt-PT" sz="1600" b="1" dirty="0"/>
+              <a:t>:</a:t>
+            </a:r>
+          </a:p>
+          <a:p>
+            <a:pPr lvl="1"/>
+            <a:r>
+              <a:rPr lang="pt-PT" sz="1300" dirty="0"/>
+              <a:t>This </a:t>
+            </a:r>
+            <a:r>
+              <a:rPr lang="pt-PT" sz="1300" dirty="0" err="1"/>
+              <a:t>behaviour</a:t>
+            </a:r>
+            <a:r>
+              <a:rPr lang="pt-PT" sz="1300" dirty="0"/>
+              <a:t> </a:t>
+            </a:r>
+            <a:r>
+              <a:rPr lang="pt-PT" sz="1300" dirty="0" err="1"/>
+              <a:t>extends</a:t>
+            </a:r>
+            <a:r>
+              <a:rPr lang="pt-PT" sz="1300" dirty="0"/>
+              <a:t> </a:t>
+            </a:r>
+            <a:r>
+              <a:rPr lang="pt-PT" sz="1300" i="1" dirty="0" err="1"/>
+              <a:t>SSResponderDispatcher</a:t>
+            </a:r>
+            <a:r>
+              <a:rPr lang="pt-PT" sz="1300" i="1" dirty="0"/>
+              <a:t>, </a:t>
+            </a:r>
+            <a:r>
+              <a:rPr lang="pt-PT" sz="1300" dirty="0" err="1"/>
+              <a:t>which</a:t>
+            </a:r>
+            <a:r>
+              <a:rPr lang="pt-PT" sz="1300" dirty="0"/>
+              <a:t> </a:t>
+            </a:r>
+            <a:r>
+              <a:rPr lang="pt-PT" sz="1300" dirty="0" err="1"/>
+              <a:t>extends</a:t>
+            </a:r>
+            <a:r>
+              <a:rPr lang="pt-PT" sz="1300" dirty="0"/>
+              <a:t> </a:t>
+            </a:r>
+            <a:r>
+              <a:rPr lang="pt-PT" sz="1300" i="1" dirty="0" err="1"/>
+              <a:t>CyclicBehaviour</a:t>
+            </a:r>
+            <a:r>
+              <a:rPr lang="pt-PT" sz="1300" i="1" dirty="0"/>
+              <a:t>. </a:t>
+            </a:r>
+            <a:r>
+              <a:rPr lang="pt-PT" sz="1300" dirty="0"/>
+              <a:t>We </a:t>
+            </a:r>
+            <a:r>
+              <a:rPr lang="pt-PT" sz="1300" dirty="0" err="1"/>
+              <a:t>started</a:t>
+            </a:r>
+            <a:r>
+              <a:rPr lang="pt-PT" sz="1300" dirty="0"/>
+              <a:t> </a:t>
+            </a:r>
+            <a:r>
+              <a:rPr lang="pt-PT" sz="1300" dirty="0" err="1"/>
+              <a:t>by</a:t>
+            </a:r>
+            <a:r>
+              <a:rPr lang="pt-PT" sz="1300" dirty="0"/>
+              <a:t> </a:t>
+            </a:r>
+            <a:r>
+              <a:rPr lang="pt-PT" sz="1300" dirty="0" err="1"/>
+              <a:t>using</a:t>
+            </a:r>
+            <a:r>
+              <a:rPr lang="pt-PT" sz="1300" dirty="0"/>
+              <a:t> the </a:t>
+            </a:r>
+            <a:r>
+              <a:rPr lang="pt-PT" sz="1300" dirty="0" err="1"/>
+              <a:t>latest</a:t>
+            </a:r>
+            <a:r>
+              <a:rPr lang="pt-PT" sz="1300" dirty="0"/>
+              <a:t> </a:t>
+            </a:r>
+            <a:r>
+              <a:rPr lang="pt-PT" sz="1300" dirty="0" err="1"/>
+              <a:t>one</a:t>
+            </a:r>
+            <a:r>
+              <a:rPr lang="pt-PT" sz="1300" dirty="0"/>
+              <a:t>, </a:t>
+            </a:r>
+            <a:r>
+              <a:rPr lang="pt-PT" sz="1300" dirty="0" err="1"/>
+              <a:t>but</a:t>
+            </a:r>
+            <a:r>
+              <a:rPr lang="pt-PT" sz="1300" dirty="0"/>
+              <a:t> </a:t>
+            </a:r>
+            <a:r>
+              <a:rPr lang="pt-PT" sz="1300" dirty="0" err="1"/>
+              <a:t>we</a:t>
+            </a:r>
+            <a:r>
+              <a:rPr lang="pt-PT" sz="1300" dirty="0"/>
+              <a:t> </a:t>
+            </a:r>
+            <a:r>
+              <a:rPr lang="pt-PT" sz="1300" dirty="0" err="1"/>
+              <a:t>found</a:t>
+            </a:r>
+            <a:r>
+              <a:rPr lang="pt-PT" sz="1300" dirty="0"/>
+              <a:t> out that it </a:t>
+            </a:r>
+            <a:r>
+              <a:rPr lang="pt-PT" sz="1300" dirty="0" err="1"/>
+              <a:t>was</a:t>
+            </a:r>
+            <a:r>
+              <a:rPr lang="pt-PT" sz="1300" dirty="0"/>
+              <a:t> </a:t>
+            </a:r>
+            <a:r>
+              <a:rPr lang="pt-PT" sz="1300" dirty="0" err="1"/>
+              <a:t>less</a:t>
+            </a:r>
+            <a:r>
+              <a:rPr lang="pt-PT" sz="1300" dirty="0"/>
+              <a:t> </a:t>
+            </a:r>
+            <a:r>
+              <a:rPr lang="pt-PT" sz="1300" dirty="0" err="1"/>
+              <a:t>reliable</a:t>
+            </a:r>
+            <a:r>
+              <a:rPr lang="pt-PT" sz="1300" dirty="0"/>
+              <a:t> to use in </a:t>
+            </a:r>
+            <a:r>
+              <a:rPr lang="pt-PT" sz="1300" dirty="0" err="1"/>
+              <a:t>conjunction</a:t>
+            </a:r>
+            <a:r>
+              <a:rPr lang="pt-PT" sz="1300" dirty="0"/>
+              <a:t> with </a:t>
+            </a:r>
+            <a:r>
+              <a:rPr lang="pt-PT" sz="1300" i="1" dirty="0" err="1"/>
+              <a:t>ContractNet</a:t>
+            </a:r>
+            <a:r>
+              <a:rPr lang="pt-PT" sz="1300" dirty="0"/>
+              <a:t> </a:t>
+            </a:r>
+            <a:r>
+              <a:rPr lang="pt-PT" sz="1300" dirty="0" err="1"/>
+              <a:t>propocol</a:t>
+            </a:r>
+            <a:r>
+              <a:rPr lang="pt-PT" sz="1300" dirty="0"/>
+              <a:t>.</a:t>
+            </a:r>
+          </a:p>
+          <a:p>
+            <a:pPr marL="228600" lvl="1" indent="0">
+              <a:buNone/>
+            </a:pPr>
+            <a:endParaRPr lang="pt-PT" sz="1300" dirty="0"/>
+          </a:p>
+          <a:p>
+            <a:r>
+              <a:rPr lang="pt-PT" sz="1600" b="1" dirty="0" err="1"/>
+              <a:t>Strategies</a:t>
+            </a:r>
+            <a:r>
+              <a:rPr lang="pt-PT" sz="1600" dirty="0"/>
+              <a:t>:</a:t>
+            </a:r>
+          </a:p>
+          <a:p>
+            <a:pPr lvl="1"/>
+            <a:r>
+              <a:rPr lang="pt-PT" sz="1300" dirty="0"/>
+              <a:t>TOMAS COMPLETE HERE WITH STRATEGIES</a:t>
+            </a:r>
+          </a:p>
+        </p:txBody>
+      </p:sp>
+      <p:sp>
+        <p:nvSpPr>
+          <p:cNvPr id="10" name="Rectangle 9">
+            <a:extLst>
+              <a:ext uri="{FF2B5EF4-FFF2-40B4-BE49-F238E27FC236}">
+                <a16:creationId xmlns:a16="http://schemas.microsoft.com/office/drawing/2014/main" id="{F1F6C2E9-B316-4410-88E5-74F044FC3575}"/>
+              </a:ext>
+              <a:ext uri="{C183D7F6-B498-43B3-948B-1728B52AA6E4}">
+                <adec:decorative xmlns:adec="http://schemas.microsoft.com/office/drawing/2017/decorative" val="1"/>
+              </a:ext>
+            </a:extLst>
+          </p:cNvPr>
+          <p:cNvSpPr>
+            <a:spLocks noGrp="1" noRot="1" noChangeAspect="1" noMove="1" noResize="1" noEditPoints="1" noAdjustHandles="1" noChangeArrowheads="1" noChangeShapeType="1" noTextEdit="1"/>
+          </p:cNvSpPr>
+          <p:nvPr>
+            <p:extLst>
+              <p:ext uri="{386F3935-93C4-4BCD-93E2-E3B085C9AB24}">
+                <p16:designElem xmlns:p16="http://schemas.microsoft.com/office/powerpoint/2015/main" val="1"/>
+              </p:ext>
+            </p:extLst>
+          </p:nvPr>
+        </p:nvSpPr>
+        <p:spPr>
+          <a:xfrm>
+            <a:off x="11058144" y="565153"/>
+            <a:ext cx="1133856" cy="6292847"/>
+          </a:xfrm>
+          <a:prstGeom prst="rect">
+            <a:avLst/>
+          </a:prstGeom>
+          <a:gradFill flip="none" rotWithShape="1">
+            <a:gsLst>
+              <a:gs pos="0">
+                <a:schemeClr val="accent1">
+                  <a:alpha val="50000"/>
+                </a:schemeClr>
+              </a:gs>
+              <a:gs pos="81000">
+                <a:schemeClr val="accent4">
+                  <a:alpha val="50000"/>
+                </a:schemeClr>
+              </a:gs>
+              <a:gs pos="25000">
+                <a:schemeClr val="accent2">
+                  <a:alpha val="60000"/>
+                </a:schemeClr>
+              </a:gs>
+              <a:gs pos="50000">
+                <a:schemeClr val="accent3">
+                  <a:alpha val="55000"/>
+                </a:schemeClr>
+              </a:gs>
+              <a:gs pos="99000">
+                <a:schemeClr val="accent5">
+                  <a:alpha val="50000"/>
+                </a:schemeClr>
+              </a:gs>
+            </a:gsLst>
+            <a:path path="circle">
+              <a:fillToRect r="100000" b="100000"/>
+            </a:path>
+            <a:tileRect l="-100000" t="-100000"/>
+          </a:gradFill>
+          <a:ln>
+            <a:noFill/>
+          </a:ln>
+        </p:spPr>
+        <p:style>
+          <a:lnRef idx="2">
+            <a:schemeClr val="accent1">
+              <a:shade val="50000"/>
+            </a:schemeClr>
+          </a:lnRef>
+          <a:fillRef idx="1">
+            <a:schemeClr val="accent1"/>
+          </a:fillRef>
+          <a:effectRef idx="0">
+            <a:schemeClr val="accent1"/>
+          </a:effectRef>
+          <a:fontRef idx="minor">
+            <a:schemeClr val="lt1"/>
+          </a:fontRef>
+        </p:style>
+        <p:txBody>
+          <a:bodyPr rtlCol="0" anchor="ctr"/>
+          <a:lstStyle/>
+          <a:p>
+            <a:pPr algn="ctr"/>
+            <a:endParaRPr lang="en-US"/>
+          </a:p>
+        </p:txBody>
+      </p:sp>
+      <p:sp>
+        <p:nvSpPr>
+          <p:cNvPr id="12" name="Rectangle 11">
+            <a:extLst>
+              <a:ext uri="{FF2B5EF4-FFF2-40B4-BE49-F238E27FC236}">
+                <a16:creationId xmlns:a16="http://schemas.microsoft.com/office/drawing/2014/main" id="{83D07262-43A6-451F-9B19-77B943C6399D}"/>
+              </a:ext>
+              <a:ext uri="{C183D7F6-B498-43B3-948B-1728B52AA6E4}">
+                <adec:decorative xmlns:adec="http://schemas.microsoft.com/office/drawing/2017/decorative" val="1"/>
+              </a:ext>
+            </a:extLst>
+          </p:cNvPr>
+          <p:cNvSpPr>
+            <a:spLocks noGrp="1" noRot="1" noChangeAspect="1" noMove="1" noResize="1" noEditPoints="1" noAdjustHandles="1" noChangeArrowheads="1" noChangeShapeType="1" noTextEdit="1"/>
+          </p:cNvSpPr>
+          <p:nvPr>
+            <p:extLst>
+              <p:ext uri="{386F3935-93C4-4BCD-93E2-E3B085C9AB24}">
+                <p16:designElem xmlns:p16="http://schemas.microsoft.com/office/powerpoint/2015/main" val="1"/>
+              </p:ext>
+            </p:extLst>
+          </p:nvPr>
+        </p:nvSpPr>
+        <p:spPr>
+          <a:xfrm>
+            <a:off x="11626850" y="1"/>
+            <a:ext cx="565150" cy="6857999"/>
+          </a:xfrm>
+          <a:prstGeom prst="rect">
+            <a:avLst/>
+          </a:prstGeom>
+          <a:gradFill flip="none" rotWithShape="1">
+            <a:gsLst>
+              <a:gs pos="0">
+                <a:schemeClr val="accent1">
+                  <a:alpha val="50000"/>
+                </a:schemeClr>
+              </a:gs>
+              <a:gs pos="81000">
+                <a:schemeClr val="accent4">
+                  <a:alpha val="50000"/>
+                </a:schemeClr>
+              </a:gs>
+              <a:gs pos="25000">
+                <a:schemeClr val="accent2">
+                  <a:alpha val="60000"/>
+                </a:schemeClr>
+              </a:gs>
+              <a:gs pos="49000">
+                <a:schemeClr val="accent3">
+                  <a:alpha val="55000"/>
+                </a:schemeClr>
+              </a:gs>
+              <a:gs pos="99000">
+                <a:schemeClr val="accent5">
+                  <a:alpha val="50000"/>
+                </a:schemeClr>
+              </a:gs>
+            </a:gsLst>
+            <a:path path="circle">
+              <a:fillToRect r="100000" b="100000"/>
+            </a:path>
+            <a:tileRect l="-100000" t="-100000"/>
+          </a:gradFill>
+          <a:ln>
+            <a:noFill/>
+          </a:ln>
+        </p:spPr>
+        <p:style>
+          <a:lnRef idx="2">
+            <a:schemeClr val="accent1">
+              <a:shade val="50000"/>
+            </a:schemeClr>
+          </a:lnRef>
+          <a:fillRef idx="1">
+            <a:schemeClr val="accent1"/>
+          </a:fillRef>
+          <a:effectRef idx="0">
+            <a:schemeClr val="accent1"/>
+          </a:effectRef>
+          <a:fontRef idx="minor">
+            <a:schemeClr val="lt1"/>
+          </a:fontRef>
+        </p:style>
+        <p:txBody>
+          <a:bodyPr rtlCol="0" anchor="ctr"/>
+          <a:lstStyle/>
+          <a:p>
+            <a:pPr algn="ctr"/>
+            <a:endParaRPr lang="en-US"/>
+          </a:p>
+        </p:txBody>
+      </p:sp>
+      <p:pic>
+        <p:nvPicPr>
+          <p:cNvPr id="4" name="Gráfico 3" descr="Filantropia com preenchimento sólido">
+            <a:extLst>
+              <a:ext uri="{FF2B5EF4-FFF2-40B4-BE49-F238E27FC236}">
+                <a16:creationId xmlns:a16="http://schemas.microsoft.com/office/drawing/2014/main" id="{374CAC7E-11D3-D2E8-FB51-03092FBCC5B7}"/>
+              </a:ext>
+            </a:extLst>
+          </p:cNvPr>
+          <p:cNvPicPr>
+            <a:picLocks noChangeAspect="1"/>
+          </p:cNvPicPr>
+          <p:nvPr/>
+        </p:nvPicPr>
+        <p:blipFill>
+          <a:blip r:embed="rId2">
+            <a:extLst>
+              <a:ext uri="{28A0092B-C50C-407E-A947-70E740481C1C}">
+                <a14:useLocalDpi xmlns:a14="http://schemas.microsoft.com/office/drawing/2010/main" val="0"/>
+              </a:ext>
+              <a:ext uri="{96DAC541-7B7A-43D3-8B79-37D633B846F1}">
+                <asvg:svgBlip xmlns:asvg="http://schemas.microsoft.com/office/drawing/2016/SVG/main" r:embed="rId3"/>
+              </a:ext>
+            </a:extLst>
+          </a:blip>
+          <a:stretch>
+            <a:fillRect/>
+          </a:stretch>
+        </p:blipFill>
+        <p:spPr>
+          <a:xfrm>
+            <a:off x="994274" y="223934"/>
+            <a:ext cx="914400" cy="914400"/>
+          </a:xfrm>
+          <a:prstGeom prst="rect">
+            <a:avLst/>
+          </a:prstGeom>
+        </p:spPr>
+      </p:pic>
+    </p:spTree>
+    <p:extLst>
+      <p:ext uri="{BB962C8B-B14F-4D97-AF65-F5344CB8AC3E}">
+        <p14:creationId xmlns:p14="http://schemas.microsoft.com/office/powerpoint/2010/main" val="369316596"/>
+      </p:ext>
+    </p:extLst>
+  </p:cSld>
+  <p:clrMapOvr>
+    <a:masterClrMapping/>
+  </p:clrMapOvr>
+</p:sld>
+</file>
+
+<file path=ppt/slides/slide7.xml><?xml version="1.0" encoding="utf-8"?>
+<p:sld xmlns:a="http://schemas.openxmlformats.org/drawingml/2006/main" xmlns:r="http://schemas.openxmlformats.org/officeDocument/2006/relationships" xmlns:p="http://schemas.openxmlformats.org/presentationml/2006/main">
+  <p:cSld>
+    <p:bg>
+      <p:bgPr>
+        <a:solidFill>
+          <a:schemeClr val="bg1"/>
+        </a:solidFill>
+        <a:effectLst/>
+      </p:bgPr>
+    </p:bg>
+    <p:spTree>
+      <p:nvGrpSpPr>
+        <p:cNvPr id="1" name=""/>
+        <p:cNvGrpSpPr/>
+        <p:nvPr/>
+      </p:nvGrpSpPr>
+      <p:grpSpPr>
+        <a:xfrm>
+          <a:off x="0" y="0"/>
+          <a:ext cx="0" cy="0"/>
+          <a:chOff x="0" y="0"/>
+          <a:chExt cx="0" cy="0"/>
+        </a:xfrm>
+      </p:grpSpPr>
+      <p:sp useBgFill="1">
+        <p:nvSpPr>
+          <p:cNvPr id="8" name="Rectangle 7">
+            <a:extLst>
+              <a:ext uri="{FF2B5EF4-FFF2-40B4-BE49-F238E27FC236}">
+                <a16:creationId xmlns:a16="http://schemas.microsoft.com/office/drawing/2014/main" id="{23BB7E73-E730-42EA-AACE-D1E323EA547E}"/>
+              </a:ext>
+              <a:ext uri="{C183D7F6-B498-43B3-948B-1728B52AA6E4}">
+                <adec:decorative xmlns:adec="http://schemas.microsoft.com/office/drawing/2017/decorative" val="1"/>
+              </a:ext>
+            </a:extLst>
+          </p:cNvPr>
+          <p:cNvSpPr>
+            <a:spLocks noGrp="1" noRot="1" noChangeAspect="1" noMove="1" noResize="1" noEditPoints="1" noAdjustHandles="1" noChangeArrowheads="1" noChangeShapeType="1" noTextEdit="1"/>
+          </p:cNvSpPr>
+          <p:nvPr>
+            <p:extLst>
+              <p:ext uri="{386F3935-93C4-4BCD-93E2-E3B085C9AB24}">
+                <p16:designElem xmlns:p16="http://schemas.microsoft.com/office/powerpoint/2015/main" val="1"/>
+              </p:ext>
+            </p:extLst>
+          </p:nvPr>
+        </p:nvSpPr>
+        <p:spPr>
+          <a:xfrm>
+            <a:off x="0" y="0"/>
+            <a:ext cx="12188952" cy="6858000"/>
+          </a:xfrm>
+          <a:prstGeom prst="rect">
+            <a:avLst/>
+          </a:prstGeom>
+          <a:ln>
+            <a:noFill/>
+          </a:ln>
+        </p:spPr>
+        <p:style>
+          <a:lnRef idx="2">
+            <a:schemeClr val="accent1">
+              <a:shade val="50000"/>
+            </a:schemeClr>
+          </a:lnRef>
+          <a:fillRef idx="1">
+            <a:schemeClr val="accent1"/>
+          </a:fillRef>
+          <a:effectRef idx="0">
+            <a:schemeClr val="accent1"/>
+          </a:effectRef>
+          <a:fontRef idx="minor">
+            <a:schemeClr val="lt1"/>
+          </a:fontRef>
+        </p:style>
+        <p:txBody>
+          <a:bodyPr rtlCol="0" anchor="ctr"/>
+          <a:lstStyle/>
+          <a:p>
+            <a:pPr algn="ctr"/>
+            <a:endParaRPr lang="en-US"/>
+          </a:p>
+        </p:txBody>
+      </p:sp>
+      <p:sp>
+        <p:nvSpPr>
+          <p:cNvPr id="2" name="Título 1">
+            <a:extLst>
+              <a:ext uri="{FF2B5EF4-FFF2-40B4-BE49-F238E27FC236}">
+                <a16:creationId xmlns:a16="http://schemas.microsoft.com/office/drawing/2014/main" id="{C1CE2670-65E5-749C-14EA-968FB66BC2C5}"/>
+              </a:ext>
+            </a:extLst>
+          </p:cNvPr>
+          <p:cNvSpPr>
+            <a:spLocks noGrp="1"/>
+          </p:cNvSpPr>
+          <p:nvPr>
+            <p:ph type="title"/>
+          </p:nvPr>
+        </p:nvSpPr>
+        <p:spPr>
+          <a:xfrm>
+            <a:off x="1908674" y="455362"/>
+            <a:ext cx="8695616" cy="571005"/>
+          </a:xfrm>
+        </p:spPr>
+        <p:txBody>
+          <a:bodyPr>
+            <a:noAutofit/>
+          </a:bodyPr>
+          <a:lstStyle/>
+          <a:p>
+            <a:r>
+              <a:rPr lang="pt-PT" sz="3200" dirty="0"/>
+              <a:t>Broker </a:t>
+            </a:r>
+            <a:r>
+              <a:rPr lang="pt-PT" sz="3200" dirty="0" err="1"/>
+              <a:t>Agent</a:t>
+            </a:r>
+            <a:endParaRPr lang="pt-PT" sz="3200" dirty="0"/>
+          </a:p>
+        </p:txBody>
+      </p:sp>
+      <p:sp>
+        <p:nvSpPr>
+          <p:cNvPr id="3" name="Marcador de Posição de Conteúdo 2">
+            <a:extLst>
+              <a:ext uri="{FF2B5EF4-FFF2-40B4-BE49-F238E27FC236}">
+                <a16:creationId xmlns:a16="http://schemas.microsoft.com/office/drawing/2014/main" id="{4AA3289D-F1AF-ACFB-7504-B14EDC4364C5}"/>
+              </a:ext>
+            </a:extLst>
+          </p:cNvPr>
+          <p:cNvSpPr>
+            <a:spLocks noGrp="1"/>
+          </p:cNvSpPr>
+          <p:nvPr>
+            <p:ph idx="1"/>
+          </p:nvPr>
+        </p:nvSpPr>
+        <p:spPr>
+          <a:xfrm>
+            <a:off x="1117600" y="1369762"/>
+            <a:ext cx="9486690" cy="4716406"/>
+          </a:xfrm>
+        </p:spPr>
+        <p:txBody>
+          <a:bodyPr>
+            <a:normAutofit/>
+          </a:bodyPr>
+          <a:lstStyle/>
+          <a:p>
+            <a:r>
+              <a:rPr lang="pt-PT" sz="1600" dirty="0"/>
+              <a:t>Juli complete here</a:t>
+            </a:r>
+          </a:p>
+        </p:txBody>
+      </p:sp>
+      <p:sp>
+        <p:nvSpPr>
+          <p:cNvPr id="10" name="Rectangle 9">
+            <a:extLst>
+              <a:ext uri="{FF2B5EF4-FFF2-40B4-BE49-F238E27FC236}">
+                <a16:creationId xmlns:a16="http://schemas.microsoft.com/office/drawing/2014/main" id="{F1F6C2E9-B316-4410-88E5-74F044FC3575}"/>
+              </a:ext>
+              <a:ext uri="{C183D7F6-B498-43B3-948B-1728B52AA6E4}">
+                <adec:decorative xmlns:adec="http://schemas.microsoft.com/office/drawing/2017/decorative" val="1"/>
+              </a:ext>
+            </a:extLst>
+          </p:cNvPr>
+          <p:cNvSpPr>
+            <a:spLocks noGrp="1" noRot="1" noChangeAspect="1" noMove="1" noResize="1" noEditPoints="1" noAdjustHandles="1" noChangeArrowheads="1" noChangeShapeType="1" noTextEdit="1"/>
+          </p:cNvSpPr>
+          <p:nvPr>
+            <p:extLst>
+              <p:ext uri="{386F3935-93C4-4BCD-93E2-E3B085C9AB24}">
+                <p16:designElem xmlns:p16="http://schemas.microsoft.com/office/powerpoint/2015/main" val="1"/>
+              </p:ext>
+            </p:extLst>
+          </p:nvPr>
+        </p:nvSpPr>
+        <p:spPr>
+          <a:xfrm>
+            <a:off x="11058144" y="565153"/>
+            <a:ext cx="1133856" cy="6292847"/>
+          </a:xfrm>
+          <a:prstGeom prst="rect">
+            <a:avLst/>
+          </a:prstGeom>
+          <a:gradFill flip="none" rotWithShape="1">
+            <a:gsLst>
+              <a:gs pos="0">
+                <a:schemeClr val="accent1">
+                  <a:alpha val="50000"/>
+                </a:schemeClr>
+              </a:gs>
+              <a:gs pos="81000">
+                <a:schemeClr val="accent4">
+                  <a:alpha val="50000"/>
+                </a:schemeClr>
+              </a:gs>
+              <a:gs pos="25000">
+                <a:schemeClr val="accent2">
+                  <a:alpha val="60000"/>
+                </a:schemeClr>
+              </a:gs>
+              <a:gs pos="50000">
+                <a:schemeClr val="accent3">
+                  <a:alpha val="55000"/>
+                </a:schemeClr>
+              </a:gs>
+              <a:gs pos="99000">
+                <a:schemeClr val="accent5">
+                  <a:alpha val="50000"/>
+                </a:schemeClr>
+              </a:gs>
+            </a:gsLst>
+            <a:path path="circle">
+              <a:fillToRect r="100000" b="100000"/>
+            </a:path>
+            <a:tileRect l="-100000" t="-100000"/>
+          </a:gradFill>
+          <a:ln>
+            <a:noFill/>
+          </a:ln>
+        </p:spPr>
+        <p:style>
+          <a:lnRef idx="2">
+            <a:schemeClr val="accent1">
+              <a:shade val="50000"/>
+            </a:schemeClr>
+          </a:lnRef>
+          <a:fillRef idx="1">
+            <a:schemeClr val="accent1"/>
+          </a:fillRef>
+          <a:effectRef idx="0">
+            <a:schemeClr val="accent1"/>
+          </a:effectRef>
+          <a:fontRef idx="minor">
+            <a:schemeClr val="lt1"/>
+          </a:fontRef>
+        </p:style>
+        <p:txBody>
+          <a:bodyPr rtlCol="0" anchor="ctr"/>
+          <a:lstStyle/>
+          <a:p>
+            <a:pPr algn="ctr"/>
+            <a:endParaRPr lang="en-US"/>
+          </a:p>
+        </p:txBody>
+      </p:sp>
+      <p:sp>
+        <p:nvSpPr>
+          <p:cNvPr id="12" name="Rectangle 11">
+            <a:extLst>
+              <a:ext uri="{FF2B5EF4-FFF2-40B4-BE49-F238E27FC236}">
+                <a16:creationId xmlns:a16="http://schemas.microsoft.com/office/drawing/2014/main" id="{83D07262-43A6-451F-9B19-77B943C6399D}"/>
+              </a:ext>
+              <a:ext uri="{C183D7F6-B498-43B3-948B-1728B52AA6E4}">
+                <adec:decorative xmlns:adec="http://schemas.microsoft.com/office/drawing/2017/decorative" val="1"/>
+              </a:ext>
+            </a:extLst>
+          </p:cNvPr>
+          <p:cNvSpPr>
+            <a:spLocks noGrp="1" noRot="1" noChangeAspect="1" noMove="1" noResize="1" noEditPoints="1" noAdjustHandles="1" noChangeArrowheads="1" noChangeShapeType="1" noTextEdit="1"/>
+          </p:cNvSpPr>
+          <p:nvPr>
+            <p:extLst>
+              <p:ext uri="{386F3935-93C4-4BCD-93E2-E3B085C9AB24}">
+                <p16:designElem xmlns:p16="http://schemas.microsoft.com/office/powerpoint/2015/main" val="1"/>
+              </p:ext>
+            </p:extLst>
+          </p:nvPr>
+        </p:nvSpPr>
+        <p:spPr>
+          <a:xfrm>
+            <a:off x="11626850" y="1"/>
+            <a:ext cx="565150" cy="6857999"/>
+          </a:xfrm>
+          <a:prstGeom prst="rect">
+            <a:avLst/>
+          </a:prstGeom>
+          <a:gradFill flip="none" rotWithShape="1">
+            <a:gsLst>
+              <a:gs pos="0">
+                <a:schemeClr val="accent1">
+                  <a:alpha val="50000"/>
+                </a:schemeClr>
+              </a:gs>
+              <a:gs pos="81000">
+                <a:schemeClr val="accent4">
+                  <a:alpha val="50000"/>
+                </a:schemeClr>
+              </a:gs>
+              <a:gs pos="25000">
+                <a:schemeClr val="accent2">
+                  <a:alpha val="60000"/>
+                </a:schemeClr>
+              </a:gs>
+              <a:gs pos="49000">
+                <a:schemeClr val="accent3">
+                  <a:alpha val="55000"/>
+                </a:schemeClr>
+              </a:gs>
+              <a:gs pos="99000">
+                <a:schemeClr val="accent5">
+                  <a:alpha val="50000"/>
+                </a:schemeClr>
+              </a:gs>
+            </a:gsLst>
+            <a:path path="circle">
+              <a:fillToRect r="100000" b="100000"/>
+            </a:path>
+            <a:tileRect l="-100000" t="-100000"/>
+          </a:gradFill>
+          <a:ln>
+            <a:noFill/>
+          </a:ln>
+        </p:spPr>
+        <p:style>
+          <a:lnRef idx="2">
+            <a:schemeClr val="accent1">
+              <a:shade val="50000"/>
+            </a:schemeClr>
+          </a:lnRef>
+          <a:fillRef idx="1">
+            <a:schemeClr val="accent1"/>
+          </a:fillRef>
+          <a:effectRef idx="0">
+            <a:schemeClr val="accent1"/>
+          </a:effectRef>
+          <a:fontRef idx="minor">
+            <a:schemeClr val="lt1"/>
+          </a:fontRef>
+        </p:style>
+        <p:txBody>
+          <a:bodyPr rtlCol="0" anchor="ctr"/>
+          <a:lstStyle/>
+          <a:p>
+            <a:pPr algn="ctr"/>
+            <a:endParaRPr lang="en-US"/>
+          </a:p>
+        </p:txBody>
+      </p:sp>
+      <p:pic>
+        <p:nvPicPr>
+          <p:cNvPr id="5" name="Gráfico 4" descr="Empréstimo com preenchimento sólido">
+            <a:extLst>
+              <a:ext uri="{FF2B5EF4-FFF2-40B4-BE49-F238E27FC236}">
+                <a16:creationId xmlns:a16="http://schemas.microsoft.com/office/drawing/2014/main" id="{702F9A0E-0789-1FF3-B4CB-3C5994CC61C7}"/>
+              </a:ext>
+            </a:extLst>
+          </p:cNvPr>
+          <p:cNvPicPr>
+            <a:picLocks noChangeAspect="1"/>
+          </p:cNvPicPr>
+          <p:nvPr/>
+        </p:nvPicPr>
+        <p:blipFill>
+          <a:blip r:embed="rId2">
+            <a:extLst>
+              <a:ext uri="{28A0092B-C50C-407E-A947-70E740481C1C}">
+                <a14:useLocalDpi xmlns:a14="http://schemas.microsoft.com/office/drawing/2010/main" val="0"/>
+              </a:ext>
+              <a:ext uri="{96DAC541-7B7A-43D3-8B79-37D633B846F1}">
+                <asvg:svgBlip xmlns:asvg="http://schemas.microsoft.com/office/drawing/2016/SVG/main" r:embed="rId3"/>
+              </a:ext>
+            </a:extLst>
+          </a:blip>
+          <a:stretch>
+            <a:fillRect/>
+          </a:stretch>
+        </p:blipFill>
+        <p:spPr>
+          <a:xfrm>
+            <a:off x="994274" y="223934"/>
+            <a:ext cx="914400" cy="914400"/>
+          </a:xfrm>
+          <a:prstGeom prst="rect">
+            <a:avLst/>
+          </a:prstGeom>
+        </p:spPr>
+      </p:pic>
+    </p:spTree>
+    <p:extLst>
+      <p:ext uri="{BB962C8B-B14F-4D97-AF65-F5344CB8AC3E}">
+        <p14:creationId xmlns:p14="http://schemas.microsoft.com/office/powerpoint/2010/main" val="3033110892"/>
+      </p:ext>
+    </p:extLst>
+  </p:cSld>
+  <p:clrMapOvr>
+    <a:masterClrMapping/>
+  </p:clrMapOvr>
+</p:sld>
+</file>
+
+<file path=ppt/slides/slide8.xml><?xml version="1.0" encoding="utf-8"?>
+<p:sld xmlns:a="http://schemas.openxmlformats.org/drawingml/2006/main" xmlns:r="http://schemas.openxmlformats.org/officeDocument/2006/relationships" xmlns:p="http://schemas.openxmlformats.org/presentationml/2006/main">
+  <p:cSld>
+    <p:bg>
+      <p:bgPr>
+        <a:solidFill>
+          <a:schemeClr val="bg1"/>
+        </a:solidFill>
+        <a:effectLst/>
+      </p:bgPr>
+    </p:bg>
+    <p:spTree>
+      <p:nvGrpSpPr>
+        <p:cNvPr id="1" name=""/>
+        <p:cNvGrpSpPr/>
+        <p:nvPr/>
+      </p:nvGrpSpPr>
+      <p:grpSpPr>
+        <a:xfrm>
+          <a:off x="0" y="0"/>
+          <a:ext cx="0" cy="0"/>
+          <a:chOff x="0" y="0"/>
+          <a:chExt cx="0" cy="0"/>
+        </a:xfrm>
+      </p:grpSpPr>
+      <p:sp useBgFill="1">
+        <p:nvSpPr>
+          <p:cNvPr id="8" name="Rectangle 7">
+            <a:extLst>
+              <a:ext uri="{FF2B5EF4-FFF2-40B4-BE49-F238E27FC236}">
+                <a16:creationId xmlns:a16="http://schemas.microsoft.com/office/drawing/2014/main" id="{23BB7E73-E730-42EA-AACE-D1E323EA547E}"/>
+              </a:ext>
+              <a:ext uri="{C183D7F6-B498-43B3-948B-1728B52AA6E4}">
+                <adec:decorative xmlns:adec="http://schemas.microsoft.com/office/drawing/2017/decorative" val="1"/>
+              </a:ext>
+            </a:extLst>
+          </p:cNvPr>
+          <p:cNvSpPr>
+            <a:spLocks noGrp="1" noRot="1" noChangeAspect="1" noMove="1" noResize="1" noEditPoints="1" noAdjustHandles="1" noChangeArrowheads="1" noChangeShapeType="1" noTextEdit="1"/>
+          </p:cNvSpPr>
+          <p:nvPr>
+            <p:extLst>
+              <p:ext uri="{386F3935-93C4-4BCD-93E2-E3B085C9AB24}">
+                <p16:designElem xmlns:p16="http://schemas.microsoft.com/office/powerpoint/2015/main" val="1"/>
+              </p:ext>
+            </p:extLst>
+          </p:nvPr>
+        </p:nvSpPr>
+        <p:spPr>
+          <a:xfrm>
+            <a:off x="0" y="0"/>
+            <a:ext cx="12188952" cy="6858000"/>
+          </a:xfrm>
+          <a:prstGeom prst="rect">
+            <a:avLst/>
+          </a:prstGeom>
+          <a:ln>
+            <a:noFill/>
+          </a:ln>
+        </p:spPr>
+        <p:style>
+          <a:lnRef idx="2">
+            <a:schemeClr val="accent1">
+              <a:shade val="50000"/>
+            </a:schemeClr>
+          </a:lnRef>
+          <a:fillRef idx="1">
+            <a:schemeClr val="accent1"/>
+          </a:fillRef>
+          <a:effectRef idx="0">
+            <a:schemeClr val="accent1"/>
+          </a:effectRef>
+          <a:fontRef idx="minor">
+            <a:schemeClr val="lt1"/>
+          </a:fontRef>
+        </p:style>
+        <p:txBody>
+          <a:bodyPr rtlCol="0" anchor="ctr"/>
+          <a:lstStyle/>
+          <a:p>
+            <a:pPr algn="ctr"/>
+            <a:endParaRPr lang="en-US"/>
+          </a:p>
+        </p:txBody>
+      </p:sp>
+      <p:sp>
+        <p:nvSpPr>
+          <p:cNvPr id="2" name="Título 1">
+            <a:extLst>
+              <a:ext uri="{FF2B5EF4-FFF2-40B4-BE49-F238E27FC236}">
+                <a16:creationId xmlns:a16="http://schemas.microsoft.com/office/drawing/2014/main" id="{C1CE2670-65E5-749C-14EA-968FB66BC2C5}"/>
+              </a:ext>
+            </a:extLst>
+          </p:cNvPr>
+          <p:cNvSpPr>
+            <a:spLocks noGrp="1"/>
+          </p:cNvSpPr>
+          <p:nvPr>
+            <p:ph type="title"/>
+          </p:nvPr>
+        </p:nvSpPr>
+        <p:spPr>
+          <a:xfrm>
+            <a:off x="1908674" y="455362"/>
+            <a:ext cx="8695616" cy="571005"/>
+          </a:xfrm>
+        </p:spPr>
+        <p:txBody>
+          <a:bodyPr>
+            <a:noAutofit/>
+          </a:bodyPr>
+          <a:lstStyle/>
+          <a:p>
+            <a:r>
+              <a:rPr lang="pt-PT" sz="3200" dirty="0"/>
+              <a:t>Exchange </a:t>
+            </a:r>
+            <a:r>
+              <a:rPr lang="pt-PT" sz="3200" dirty="0" err="1"/>
+              <a:t>Agent</a:t>
+            </a:r>
+            <a:endParaRPr lang="pt-PT" sz="3200" dirty="0"/>
+          </a:p>
+        </p:txBody>
+      </p:sp>
+      <p:sp>
+        <p:nvSpPr>
+          <p:cNvPr id="3" name="Marcador de Posição de Conteúdo 2">
+            <a:extLst>
+              <a:ext uri="{FF2B5EF4-FFF2-40B4-BE49-F238E27FC236}">
+                <a16:creationId xmlns:a16="http://schemas.microsoft.com/office/drawing/2014/main" id="{4AA3289D-F1AF-ACFB-7504-B14EDC4364C5}"/>
+              </a:ext>
+            </a:extLst>
+          </p:cNvPr>
+          <p:cNvSpPr>
+            <a:spLocks noGrp="1"/>
+          </p:cNvSpPr>
+          <p:nvPr>
+            <p:ph idx="1"/>
+          </p:nvPr>
+        </p:nvSpPr>
+        <p:spPr>
+          <a:xfrm>
+            <a:off x="1117600" y="1354558"/>
+            <a:ext cx="9486690" cy="4731610"/>
+          </a:xfrm>
+        </p:spPr>
+        <p:txBody>
+          <a:bodyPr>
+            <a:normAutofit/>
+          </a:bodyPr>
+          <a:lstStyle/>
+          <a:p>
+            <a:r>
+              <a:rPr lang="pt-PT" sz="1600" dirty="0"/>
+              <a:t>JULI COMPLETE HERE</a:t>
+            </a:r>
+          </a:p>
+        </p:txBody>
+      </p:sp>
+      <p:sp>
+        <p:nvSpPr>
+          <p:cNvPr id="10" name="Rectangle 9">
+            <a:extLst>
+              <a:ext uri="{FF2B5EF4-FFF2-40B4-BE49-F238E27FC236}">
+                <a16:creationId xmlns:a16="http://schemas.microsoft.com/office/drawing/2014/main" id="{F1F6C2E9-B316-4410-88E5-74F044FC3575}"/>
+              </a:ext>
+              <a:ext uri="{C183D7F6-B498-43B3-948B-1728B52AA6E4}">
+                <adec:decorative xmlns:adec="http://schemas.microsoft.com/office/drawing/2017/decorative" val="1"/>
+              </a:ext>
+            </a:extLst>
+          </p:cNvPr>
+          <p:cNvSpPr>
+            <a:spLocks noGrp="1" noRot="1" noChangeAspect="1" noMove="1" noResize="1" noEditPoints="1" noAdjustHandles="1" noChangeArrowheads="1" noChangeShapeType="1" noTextEdit="1"/>
+          </p:cNvSpPr>
+          <p:nvPr>
+            <p:extLst>
+              <p:ext uri="{386F3935-93C4-4BCD-93E2-E3B085C9AB24}">
+                <p16:designElem xmlns:p16="http://schemas.microsoft.com/office/powerpoint/2015/main" val="1"/>
+              </p:ext>
+            </p:extLst>
+          </p:nvPr>
+        </p:nvSpPr>
+        <p:spPr>
+          <a:xfrm>
+            <a:off x="11058144" y="565153"/>
+            <a:ext cx="1133856" cy="6292847"/>
+          </a:xfrm>
+          <a:prstGeom prst="rect">
+            <a:avLst/>
+          </a:prstGeom>
+          <a:gradFill flip="none" rotWithShape="1">
+            <a:gsLst>
+              <a:gs pos="0">
+                <a:schemeClr val="accent1">
+                  <a:alpha val="50000"/>
+                </a:schemeClr>
+              </a:gs>
+              <a:gs pos="81000">
+                <a:schemeClr val="accent4">
+                  <a:alpha val="50000"/>
+                </a:schemeClr>
+              </a:gs>
+              <a:gs pos="25000">
+                <a:schemeClr val="accent2">
+                  <a:alpha val="60000"/>
+                </a:schemeClr>
+              </a:gs>
+              <a:gs pos="50000">
+                <a:schemeClr val="accent3">
+                  <a:alpha val="55000"/>
+                </a:schemeClr>
+              </a:gs>
+              <a:gs pos="99000">
+                <a:schemeClr val="accent5">
+                  <a:alpha val="50000"/>
+                </a:schemeClr>
+              </a:gs>
+            </a:gsLst>
+            <a:path path="circle">
+              <a:fillToRect r="100000" b="100000"/>
+            </a:path>
+            <a:tileRect l="-100000" t="-100000"/>
+          </a:gradFill>
+          <a:ln>
+            <a:noFill/>
+          </a:ln>
+        </p:spPr>
+        <p:style>
+          <a:lnRef idx="2">
+            <a:schemeClr val="accent1">
+              <a:shade val="50000"/>
+            </a:schemeClr>
+          </a:lnRef>
+          <a:fillRef idx="1">
+            <a:schemeClr val="accent1"/>
+          </a:fillRef>
+          <a:effectRef idx="0">
+            <a:schemeClr val="accent1"/>
+          </a:effectRef>
+          <a:fontRef idx="minor">
+            <a:schemeClr val="lt1"/>
+          </a:fontRef>
+        </p:style>
+        <p:txBody>
+          <a:bodyPr rtlCol="0" anchor="ctr"/>
+          <a:lstStyle/>
+          <a:p>
+            <a:pPr algn="ctr"/>
+            <a:endParaRPr lang="en-US"/>
+          </a:p>
+        </p:txBody>
+      </p:sp>
+      <p:sp>
+        <p:nvSpPr>
+          <p:cNvPr id="12" name="Rectangle 11">
+            <a:extLst>
+              <a:ext uri="{FF2B5EF4-FFF2-40B4-BE49-F238E27FC236}">
+                <a16:creationId xmlns:a16="http://schemas.microsoft.com/office/drawing/2014/main" id="{83D07262-43A6-451F-9B19-77B943C6399D}"/>
+              </a:ext>
+              <a:ext uri="{C183D7F6-B498-43B3-948B-1728B52AA6E4}">
+                <adec:decorative xmlns:adec="http://schemas.microsoft.com/office/drawing/2017/decorative" val="1"/>
+              </a:ext>
+            </a:extLst>
+          </p:cNvPr>
+          <p:cNvSpPr>
+            <a:spLocks noGrp="1" noRot="1" noChangeAspect="1" noMove="1" noResize="1" noEditPoints="1" noAdjustHandles="1" noChangeArrowheads="1" noChangeShapeType="1" noTextEdit="1"/>
+          </p:cNvSpPr>
+          <p:nvPr>
+            <p:extLst>
+              <p:ext uri="{386F3935-93C4-4BCD-93E2-E3B085C9AB24}">
+                <p16:designElem xmlns:p16="http://schemas.microsoft.com/office/powerpoint/2015/main" val="1"/>
+              </p:ext>
+            </p:extLst>
+          </p:nvPr>
+        </p:nvSpPr>
+        <p:spPr>
+          <a:xfrm>
+            <a:off x="11626850" y="1"/>
+            <a:ext cx="565150" cy="6857999"/>
+          </a:xfrm>
+          <a:prstGeom prst="rect">
+            <a:avLst/>
+          </a:prstGeom>
+          <a:gradFill flip="none" rotWithShape="1">
+            <a:gsLst>
+              <a:gs pos="0">
+                <a:schemeClr val="accent1">
+                  <a:alpha val="50000"/>
+                </a:schemeClr>
+              </a:gs>
+              <a:gs pos="81000">
+                <a:schemeClr val="accent4">
+                  <a:alpha val="50000"/>
+                </a:schemeClr>
+              </a:gs>
+              <a:gs pos="25000">
+                <a:schemeClr val="accent2">
+                  <a:alpha val="60000"/>
+                </a:schemeClr>
+              </a:gs>
+              <a:gs pos="49000">
+                <a:schemeClr val="accent3">
+                  <a:alpha val="55000"/>
+                </a:schemeClr>
+              </a:gs>
+              <a:gs pos="99000">
+                <a:schemeClr val="accent5">
+                  <a:alpha val="50000"/>
+                </a:schemeClr>
+              </a:gs>
+            </a:gsLst>
+            <a:path path="circle">
+              <a:fillToRect r="100000" b="100000"/>
+            </a:path>
+            <a:tileRect l="-100000" t="-100000"/>
+          </a:gradFill>
+          <a:ln>
+            <a:noFill/>
+          </a:ln>
+        </p:spPr>
+        <p:style>
+          <a:lnRef idx="2">
+            <a:schemeClr val="accent1">
+              <a:shade val="50000"/>
+            </a:schemeClr>
+          </a:lnRef>
+          <a:fillRef idx="1">
+            <a:schemeClr val="accent1"/>
+          </a:fillRef>
+          <a:effectRef idx="0">
+            <a:schemeClr val="accent1"/>
+          </a:effectRef>
+          <a:fontRef idx="minor">
+            <a:schemeClr val="lt1"/>
+          </a:fontRef>
+        </p:style>
+        <p:txBody>
+          <a:bodyPr rtlCol="0" anchor="ctr"/>
+          <a:lstStyle/>
+          <a:p>
+            <a:pPr algn="ctr"/>
+            <a:endParaRPr lang="en-US"/>
+          </a:p>
+        </p:txBody>
+      </p:sp>
+      <p:pic>
+        <p:nvPicPr>
+          <p:cNvPr id="4" name="Gráfico 3" descr="Loja com preenchimento sólido">
+            <a:extLst>
+              <a:ext uri="{FF2B5EF4-FFF2-40B4-BE49-F238E27FC236}">
+                <a16:creationId xmlns:a16="http://schemas.microsoft.com/office/drawing/2014/main" id="{3C5147AB-955F-1F5C-79FB-05623413715D}"/>
+              </a:ext>
+            </a:extLst>
+          </p:cNvPr>
+          <p:cNvPicPr>
+            <a:picLocks noChangeAspect="1"/>
+          </p:cNvPicPr>
+          <p:nvPr/>
+        </p:nvPicPr>
+        <p:blipFill>
+          <a:blip r:embed="rId2">
+            <a:extLst>
+              <a:ext uri="{28A0092B-C50C-407E-A947-70E740481C1C}">
+                <a14:useLocalDpi xmlns:a14="http://schemas.microsoft.com/office/drawing/2010/main" val="0"/>
+              </a:ext>
+              <a:ext uri="{96DAC541-7B7A-43D3-8B79-37D633B846F1}">
+                <asvg:svgBlip xmlns:asvg="http://schemas.microsoft.com/office/drawing/2016/SVG/main" r:embed="rId3"/>
+              </a:ext>
+            </a:extLst>
+          </a:blip>
+          <a:stretch>
+            <a:fillRect/>
+          </a:stretch>
+        </p:blipFill>
+        <p:spPr>
+          <a:xfrm>
+            <a:off x="994274" y="220079"/>
+            <a:ext cx="914400" cy="914400"/>
+          </a:xfrm>
+          <a:prstGeom prst="rect">
+            <a:avLst/>
+          </a:prstGeom>
+        </p:spPr>
+      </p:pic>
+    </p:spTree>
+    <p:extLst>
+      <p:ext uri="{BB962C8B-B14F-4D97-AF65-F5344CB8AC3E}">
+        <p14:creationId xmlns:p14="http://schemas.microsoft.com/office/powerpoint/2010/main" val="2427285628"/>
+      </p:ext>
+    </p:extLst>
+  </p:cSld>
+  <p:clrMapOvr>
+    <a:masterClrMapping/>
+  </p:clrMapOvr>
+</p:sld>
+</file>
+
+<file path=ppt/slides/slide9.xml><?xml version="1.0" encoding="utf-8"?>
+<p:sld xmlns:a="http://schemas.openxmlformats.org/drawingml/2006/main" xmlns:r="http://schemas.openxmlformats.org/officeDocument/2006/relationships" xmlns:p="http://schemas.openxmlformats.org/presentationml/2006/main">
+  <p:cSld>
+    <p:spTree>
+      <p:nvGrpSpPr>
+        <p:cNvPr id="1" name=""/>
+        <p:cNvGrpSpPr/>
+        <p:nvPr/>
+      </p:nvGrpSpPr>
+      <p:grpSpPr>
+        <a:xfrm>
+          <a:off x="0" y="0"/>
+          <a:ext cx="0" cy="0"/>
+          <a:chOff x="0" y="0"/>
+          <a:chExt cx="0" cy="0"/>
+        </a:xfrm>
+      </p:grpSpPr>
+      <p:sp>
+        <p:nvSpPr>
+          <p:cNvPr id="2" name="Título 1">
+            <a:extLst>
+              <a:ext uri="{FF2B5EF4-FFF2-40B4-BE49-F238E27FC236}">
+                <a16:creationId xmlns:a16="http://schemas.microsoft.com/office/drawing/2014/main" id="{97C3E317-4DA5-0887-B670-1C5B5AF9E766}"/>
+              </a:ext>
+            </a:extLst>
+          </p:cNvPr>
+          <p:cNvSpPr>
+            <a:spLocks noGrp="1"/>
+          </p:cNvSpPr>
+          <p:nvPr>
+            <p:ph type="title"/>
+          </p:nvPr>
+        </p:nvSpPr>
+        <p:spPr>
+          <a:xfrm>
+            <a:off x="1587710" y="455363"/>
+            <a:ext cx="9486690" cy="695802"/>
+          </a:xfrm>
+        </p:spPr>
+        <p:txBody>
+          <a:bodyPr>
+            <a:normAutofit/>
+          </a:bodyPr>
+          <a:lstStyle/>
+          <a:p>
+            <a:r>
+              <a:rPr lang="pt-PT" sz="3200" dirty="0" err="1"/>
+              <a:t>Results</a:t>
+            </a:r>
+            <a:r>
+              <a:rPr lang="pt-PT" sz="3200" dirty="0"/>
+              <a:t> </a:t>
+            </a:r>
+            <a:r>
+              <a:rPr lang="pt-PT" sz="3200" dirty="0" err="1"/>
+              <a:t>Analysis</a:t>
+            </a:r>
+            <a:endParaRPr lang="pt-PT" sz="3200" dirty="0"/>
+          </a:p>
+        </p:txBody>
+      </p:sp>
+      <p:sp>
+        <p:nvSpPr>
+          <p:cNvPr id="3" name="Marcador de Posição de Conteúdo 2">
+            <a:extLst>
+              <a:ext uri="{FF2B5EF4-FFF2-40B4-BE49-F238E27FC236}">
+                <a16:creationId xmlns:a16="http://schemas.microsoft.com/office/drawing/2014/main" id="{307F6385-7A4D-4E91-6A02-EE6CA6E1B763}"/>
+              </a:ext>
+            </a:extLst>
+          </p:cNvPr>
+          <p:cNvSpPr>
+            <a:spLocks noGrp="1"/>
+          </p:cNvSpPr>
+          <p:nvPr>
+            <p:ph idx="1"/>
+          </p:nvPr>
+        </p:nvSpPr>
+        <p:spPr>
+          <a:xfrm>
+            <a:off x="1587710" y="1151165"/>
+            <a:ext cx="9486690" cy="4935003"/>
+          </a:xfrm>
+        </p:spPr>
+        <p:txBody>
+          <a:bodyPr>
+            <a:normAutofit/>
+          </a:bodyPr>
+          <a:lstStyle/>
+          <a:p>
+            <a:r>
+              <a:rPr lang="en-US" sz="1600" dirty="0"/>
+              <a:t>TOMAS COMPLETE HERE</a:t>
+            </a:r>
+            <a:endParaRPr lang="pt-PT" sz="2000" dirty="0"/>
+          </a:p>
+        </p:txBody>
+      </p:sp>
+    </p:spTree>
+    <p:extLst>
+      <p:ext uri="{BB962C8B-B14F-4D97-AF65-F5344CB8AC3E}">
+        <p14:creationId xmlns:p14="http://schemas.microsoft.com/office/powerpoint/2010/main" val="1618577274"/>
       </p:ext>
     </p:extLst>
   </p:cSld>

</xml_diff>

<commit_message>
Broker and stock agents in presentation
</commit_message>
<xml_diff>
--- a/docs/presentation.pptx
+++ b/docs/presentation.pptx
@@ -497,7 +497,7 @@
           <a:p>
             <a:fld id="{14DFC975-2FD7-44A5-9E78-ECBA46156075}" type="slidenum">
               <a:rPr lang="en-US" smtClean="0"/>
-              <a:t>‹nº›</a:t>
+              <a:t>‹Nº›</a:t>
             </a:fld>
             <a:endParaRPr lang="en-US"/>
           </a:p>
@@ -707,7 +707,7 @@
           <a:p>
             <a:fld id="{14DFC975-2FD7-44A5-9E78-ECBA46156075}" type="slidenum">
               <a:rPr lang="en-US" smtClean="0"/>
-              <a:t>‹nº›</a:t>
+              <a:t>‹Nº›</a:t>
             </a:fld>
             <a:endParaRPr lang="en-US"/>
           </a:p>
@@ -1079,7 +1079,7 @@
           <a:p>
             <a:fld id="{14DFC975-2FD7-44A5-9E78-ECBA46156075}" type="slidenum">
               <a:rPr lang="en-US" smtClean="0"/>
-              <a:t>‹nº›</a:t>
+              <a:t>‹Nº›</a:t>
             </a:fld>
             <a:endParaRPr lang="en-US"/>
           </a:p>
@@ -1441,7 +1441,7 @@
           <a:p>
             <a:fld id="{14DFC975-2FD7-44A5-9E78-ECBA46156075}" type="slidenum">
               <a:rPr lang="en-US" smtClean="0"/>
-              <a:t>‹nº›</a:t>
+              <a:t>‹Nº›</a:t>
             </a:fld>
             <a:endParaRPr lang="en-US"/>
           </a:p>
@@ -1886,7 +1886,7 @@
           <a:p>
             <a:fld id="{14DFC975-2FD7-44A5-9E78-ECBA46156075}" type="slidenum">
               <a:rPr lang="en-US" smtClean="0"/>
-              <a:t>‹nº›</a:t>
+              <a:t>‹Nº›</a:t>
             </a:fld>
             <a:endParaRPr lang="en-US"/>
           </a:p>
@@ -2321,7 +2321,7 @@
           <a:p>
             <a:fld id="{14DFC975-2FD7-44A5-9E78-ECBA46156075}" type="slidenum">
               <a:rPr lang="en-US" smtClean="0"/>
-              <a:t>‹nº›</a:t>
+              <a:t>‹Nº›</a:t>
             </a:fld>
             <a:endParaRPr lang="en-US"/>
           </a:p>
@@ -2929,7 +2929,7 @@
           <a:p>
             <a:fld id="{14DFC975-2FD7-44A5-9E78-ECBA46156075}" type="slidenum">
               <a:rPr lang="en-US" smtClean="0"/>
-              <a:t>‹nº›</a:t>
+              <a:t>‹Nº›</a:t>
             </a:fld>
             <a:endParaRPr lang="en-US"/>
           </a:p>
@@ -3234,7 +3234,7 @@
           <a:p>
             <a:fld id="{14DFC975-2FD7-44A5-9E78-ECBA46156075}" type="slidenum">
               <a:rPr lang="en-US" smtClean="0"/>
-              <a:t>‹nº›</a:t>
+              <a:t>‹Nº›</a:t>
             </a:fld>
             <a:endParaRPr lang="en-US"/>
           </a:p>
@@ -3511,7 +3511,7 @@
           <a:p>
             <a:fld id="{14DFC975-2FD7-44A5-9E78-ECBA46156075}" type="slidenum">
               <a:rPr lang="en-US" smtClean="0"/>
-              <a:t>‹nº›</a:t>
+              <a:t>‹Nº›</a:t>
             </a:fld>
             <a:endParaRPr lang="en-US"/>
           </a:p>
@@ -3988,7 +3988,7 @@
           <a:p>
             <a:fld id="{14DFC975-2FD7-44A5-9E78-ECBA46156075}" type="slidenum">
               <a:rPr lang="en-US" smtClean="0"/>
-              <a:t>‹nº›</a:t>
+              <a:t>‹Nº›</a:t>
             </a:fld>
             <a:endParaRPr lang="en-US"/>
           </a:p>
@@ -4443,7 +4443,7 @@
           <a:p>
             <a:fld id="{14DFC975-2FD7-44A5-9E78-ECBA46156075}" type="slidenum">
               <a:rPr lang="en-US" smtClean="0"/>
-              <a:t>‹nº›</a:t>
+              <a:t>‹Nº›</a:t>
             </a:fld>
             <a:endParaRPr lang="en-US"/>
           </a:p>
@@ -4886,7 +4886,7 @@
             <a:fld id="{14DFC975-2FD7-44A5-9E78-ECBA46156075}" type="slidenum">
               <a:rPr lang="en-US" smtClean="0"/>
               <a:pPr/>
-              <a:t>‹nº›</a:t>
+              <a:t>‹Nº›</a:t>
             </a:fld>
             <a:endParaRPr lang="en-US"/>
           </a:p>
@@ -8332,103 +8332,15 @@
           <a:p>
             <a:r>
               <a:rPr lang="pt-PT" sz="1600" dirty="0"/>
-              <a:t>The agente </a:t>
-            </a:r>
-            <a:r>
-              <a:rPr lang="pt-PT" sz="1600" dirty="0" err="1"/>
-              <a:t>starts</a:t>
+              <a:t>The agent starts by loading the data from the </a:t>
+            </a:r>
+            <a:r>
+              <a:rPr lang="pt-PT" sz="1600" i="1" dirty="0"/>
+              <a:t>json</a:t>
             </a:r>
             <a:r>
               <a:rPr lang="pt-PT" sz="1600" dirty="0"/>
-              <a:t> </a:t>
-            </a:r>
-            <a:r>
-              <a:rPr lang="pt-PT" sz="1600" dirty="0" err="1"/>
-              <a:t>by</a:t>
-            </a:r>
-            <a:r>
-              <a:rPr lang="pt-PT" sz="1600" dirty="0"/>
-              <a:t> </a:t>
-            </a:r>
-            <a:r>
-              <a:rPr lang="pt-PT" sz="1600" dirty="0" err="1"/>
-              <a:t>loading</a:t>
-            </a:r>
-            <a:r>
-              <a:rPr lang="pt-PT" sz="1600" dirty="0"/>
-              <a:t> the data </a:t>
-            </a:r>
-            <a:r>
-              <a:rPr lang="pt-PT" sz="1600" dirty="0" err="1"/>
-              <a:t>from</a:t>
-            </a:r>
-            <a:r>
-              <a:rPr lang="pt-PT" sz="1600" dirty="0"/>
-              <a:t> the </a:t>
-            </a:r>
-            <a:r>
-              <a:rPr lang="pt-PT" sz="1600" i="1" dirty="0" err="1"/>
-              <a:t>json</a:t>
-            </a:r>
-            <a:r>
-              <a:rPr lang="pt-PT" sz="1600" dirty="0"/>
-              <a:t> file </a:t>
-            </a:r>
-            <a:r>
-              <a:rPr lang="pt-PT" sz="1600" dirty="0" err="1"/>
-              <a:t>and</a:t>
-            </a:r>
-            <a:r>
-              <a:rPr lang="pt-PT" sz="1600" dirty="0"/>
-              <a:t> </a:t>
-            </a:r>
-            <a:r>
-              <a:rPr lang="pt-PT" sz="1600" dirty="0" err="1"/>
-              <a:t>convert</a:t>
-            </a:r>
-            <a:r>
-              <a:rPr lang="pt-PT" sz="1600" dirty="0"/>
-              <a:t> it to a </a:t>
-            </a:r>
-            <a:r>
-              <a:rPr lang="pt-PT" sz="1600" dirty="0" err="1"/>
-              <a:t>list</a:t>
-            </a:r>
-            <a:r>
-              <a:rPr lang="pt-PT" sz="1600" dirty="0"/>
-              <a:t> </a:t>
-            </a:r>
-            <a:r>
-              <a:rPr lang="pt-PT" sz="1600" dirty="0" err="1"/>
-              <a:t>of</a:t>
-            </a:r>
-            <a:r>
-              <a:rPr lang="pt-PT" sz="1600" dirty="0"/>
-              <a:t> </a:t>
-            </a:r>
-            <a:r>
-              <a:rPr lang="pt-PT" sz="1600" dirty="0" err="1"/>
-              <a:t>lists</a:t>
-            </a:r>
-            <a:r>
-              <a:rPr lang="pt-PT" sz="1600" dirty="0"/>
-              <a:t> </a:t>
-            </a:r>
-            <a:r>
-              <a:rPr lang="pt-PT" sz="1600" dirty="0" err="1"/>
-              <a:t>of</a:t>
-            </a:r>
-            <a:r>
-              <a:rPr lang="pt-PT" sz="1600" dirty="0"/>
-              <a:t> </a:t>
-            </a:r>
-            <a:r>
-              <a:rPr lang="pt-PT" sz="1600" dirty="0" err="1"/>
-              <a:t>HashMaps</a:t>
-            </a:r>
-            <a:r>
-              <a:rPr lang="pt-PT" sz="1600" dirty="0"/>
-              <a:t>. </a:t>
+              <a:t> file and convert it to a list of lists of HashMaps. </a:t>
             </a:r>
             <a:r>
               <a:rPr lang="pt-PT" sz="1600" dirty="0" err="1"/>
@@ -10027,8 +9939,74 @@
           <a:p>
             <a:r>
               <a:rPr lang="pt-PT" sz="1600" dirty="0"/>
-              <a:t>Juli complete here</a:t>
-            </a:r>
+              <a:t>This agent is the mediator between the trader agents and the stock exchange agent. It allows three different operations: </a:t>
+            </a:r>
+            <a:r>
+              <a:rPr lang="pt-PT" sz="1600" b="1" dirty="0"/>
+              <a:t>BUY, SELL, SHORT.</a:t>
+            </a:r>
+          </a:p>
+          <a:p>
+            <a:r>
+              <a:rPr lang="pt-PT" sz="1600" dirty="0"/>
+              <a:t>The broker agents are the ones that actually create orders in the stock exchange market. These are the only ones capable of doing these operations.</a:t>
+            </a:r>
+          </a:p>
+          <a:p>
+            <a:r>
+              <a:rPr lang="pt-PT" sz="1600" dirty="0"/>
+              <a:t>Each Broker agent can have different costs, comissions and even allow margin on the operations requested by the traders. </a:t>
+            </a:r>
+          </a:p>
+          <a:p>
+            <a:endParaRPr lang="pt-PT" sz="1600" dirty="0"/>
+          </a:p>
+          <a:p>
+            <a:r>
+              <a:rPr lang="pt-PT" sz="1600" dirty="0"/>
+              <a:t>The broker agent has a unique cyclic behaviour composed of two different interaction protocols:</a:t>
+            </a:r>
+          </a:p>
+          <a:p>
+            <a:pPr lvl="1"/>
+            <a:r>
+              <a:rPr lang="pt-PT" sz="1300" dirty="0"/>
+              <a:t> </a:t>
+            </a:r>
+            <a:r>
+              <a:rPr lang="pt-PT" sz="1300" b="1" dirty="0"/>
+              <a:t>MyContractNetResponder (ContractNetResponder)</a:t>
+            </a:r>
+          </a:p>
+          <a:p>
+            <a:pPr marL="228600" lvl="1" indent="0">
+              <a:buNone/>
+            </a:pPr>
+            <a:r>
+              <a:rPr lang="pt-PT" sz="1300" dirty="0"/>
+              <a:t>Interaction between the Broker Agent and the Trader in order to give back the proposal of the broker to the requested operation by the trader. </a:t>
+            </a:r>
+            <a:endParaRPr lang="pt-PT" sz="1300" b="1" dirty="0"/>
+          </a:p>
+          <a:p>
+            <a:pPr lvl="1"/>
+            <a:r>
+              <a:rPr lang="pt-PT" sz="1300" b="1" dirty="0"/>
+              <a:t>MyRequestInitiator (AchieveREInitiator)</a:t>
+            </a:r>
+          </a:p>
+          <a:p>
+            <a:pPr marL="228600" lvl="1" indent="0">
+              <a:buNone/>
+            </a:pPr>
+            <a:r>
+              <a:rPr lang="pt-PT" sz="1300" dirty="0"/>
+              <a:t>Interaction between the Broker Agent and the Stock Exchange Agent to request the operation to the stock exchange and handle it’s response, that can be ACCEPT, REFUSE or FAILURE.</a:t>
+            </a:r>
+          </a:p>
+          <a:p>
+            <a:pPr lvl="1"/>
+            <a:endParaRPr lang="pt-PT" sz="1300" dirty="0"/>
           </a:p>
         </p:txBody>
       </p:sp>
@@ -10385,13 +10363,8 @@
           <a:p>
             <a:r>
               <a:rPr lang="pt-PT" sz="3200" dirty="0"/>
-              <a:t>Exchange </a:t>
-            </a:r>
-            <a:r>
-              <a:rPr lang="pt-PT" sz="3200" dirty="0" err="1"/>
-              <a:t>Agent</a:t>
-            </a:r>
-            <a:endParaRPr lang="pt-PT" sz="3200" dirty="0"/>
+              <a:t>Stock Exchange Agent</a:t>
+            </a:r>
           </a:p>
         </p:txBody>
       </p:sp>
@@ -10425,8 +10398,58 @@
           <a:p>
             <a:r>
               <a:rPr lang="pt-PT" sz="1600" dirty="0"/>
-              <a:t>JULI COMPLETE HERE</a:t>
-            </a:r>
+              <a:t>This agent is the one that simulates the real stock exchange market. It is in charge of managing the orders of certified brokers.</a:t>
+            </a:r>
+          </a:p>
+          <a:p>
+            <a:r>
+              <a:rPr lang="pt-PT" sz="1600" dirty="0"/>
+              <a:t>As this is a simulation, the operations won’t infulence the market values, so there is no need to match the orders. It is assumed that all certified orders will be 100% succesful.</a:t>
+            </a:r>
+          </a:p>
+          <a:p>
+            <a:endParaRPr lang="pt-PT" sz="1600" dirty="0"/>
+          </a:p>
+          <a:p>
+            <a:r>
+              <a:rPr lang="pt-PT" sz="1600" dirty="0"/>
+              <a:t>The Stock Exchange Agent has a unique cyclic behaviour based on a Request Protocol:</a:t>
+            </a:r>
+          </a:p>
+          <a:p>
+            <a:pPr lvl="1"/>
+            <a:r>
+              <a:rPr lang="pt-PT" sz="1300" b="1" dirty="0"/>
+              <a:t>MyRequestResponder(AchieveREResponder)</a:t>
+            </a:r>
+          </a:p>
+          <a:p>
+            <a:pPr marL="228600" lvl="1" indent="0">
+              <a:buNone/>
+            </a:pPr>
+            <a:r>
+              <a:rPr lang="pt-PT" sz="1300" dirty="0"/>
+              <a:t>Interaction between the Broker Agent and the Stock Exchange Agent to handle the requested operations by the certified brokers and notify the broker agents with the response to each request.</a:t>
+            </a:r>
+          </a:p>
+          <a:p>
+            <a:pPr marL="228600" lvl="1" indent="0">
+              <a:buNone/>
+            </a:pPr>
+            <a:r>
+              <a:rPr lang="pt-PT" sz="1300" dirty="0"/>
+              <a:t>As it has been mentioned before,  the stock exchange agent will consider all the orders succesful, so all the requests of the brokers will be accepted.</a:t>
+            </a:r>
+          </a:p>
+          <a:p>
+            <a:pPr marL="228600" lvl="1" indent="0">
+              <a:buNone/>
+            </a:pPr>
+            <a:endParaRPr lang="pt-PT" sz="1300" b="1" dirty="0"/>
+          </a:p>
+          <a:p>
+            <a:pPr lvl="1"/>
+            <a:endParaRPr lang="pt-PT" sz="1300" b="1" dirty="0"/>
           </a:p>
         </p:txBody>
       </p:sp>

</xml_diff>